<commit_message>
added modesheet HOMMA v3 modified concept sheet and some layouts
</commit_message>
<xml_diff>
--- a/models/モデルシートHOMMAv2.pptx
+++ b/models/モデルシートHOMMAv2.pptx
@@ -5,16 +5,15 @@
     <p:sldMasterId id="2147483648" r:id="rId1"/>
   </p:sldMasterIdLst>
   <p:notesMasterIdLst>
-    <p:notesMasterId r:id="rId9"/>
+    <p:notesMasterId r:id="rId8"/>
   </p:notesMasterIdLst>
   <p:sldIdLst>
-    <p:sldId id="256" r:id="rId2"/>
+    <p:sldId id="270" r:id="rId2"/>
     <p:sldId id="267" r:id="rId3"/>
     <p:sldId id="266" r:id="rId4"/>
     <p:sldId id="263" r:id="rId5"/>
     <p:sldId id="269" r:id="rId6"/>
     <p:sldId id="265" r:id="rId7"/>
-    <p:sldId id="268" r:id="rId8"/>
   </p:sldIdLst>
   <p:sldSz cx="13584238" cy="9601200"/>
   <p:notesSz cx="7099300" cy="10234613"/>
@@ -27669,11 +27668,11 @@
           <c:showPercent val="0"/>
           <c:showBubbleSize val="0"/>
         </c:dLbls>
-        <c:axId val="87165760"/>
-        <c:axId val="87166336"/>
+        <c:axId val="78351360"/>
+        <c:axId val="81298176"/>
       </c:scatterChart>
       <c:valAx>
-        <c:axId val="87165760"/>
+        <c:axId val="78351360"/>
         <c:scaling>
           <c:orientation val="minMax"/>
         </c:scaling>
@@ -27683,12 +27682,12 @@
         <c:majorTickMark val="out"/>
         <c:minorTickMark val="none"/>
         <c:tickLblPos val="nextTo"/>
-        <c:crossAx val="87166336"/>
+        <c:crossAx val="81298176"/>
         <c:crosses val="autoZero"/>
         <c:crossBetween val="midCat"/>
       </c:valAx>
       <c:valAx>
-        <c:axId val="87166336"/>
+        <c:axId val="81298176"/>
         <c:scaling>
           <c:orientation val="minMax"/>
         </c:scaling>
@@ -27698,7 +27697,7 @@
         <c:majorTickMark val="out"/>
         <c:minorTickMark val="none"/>
         <c:tickLblPos val="nextTo"/>
-        <c:crossAx val="87165760"/>
+        <c:crossAx val="78351360"/>
         <c:crosses val="autoZero"/>
         <c:crossBetween val="midCat"/>
       </c:valAx>
@@ -27921,11 +27920,11 @@
         </c:dLbls>
         <c:marker val="1"/>
         <c:smooth val="0"/>
-        <c:axId val="91466752"/>
-        <c:axId val="87168064"/>
+        <c:axId val="82882560"/>
+        <c:axId val="82884096"/>
       </c:lineChart>
       <c:catAx>
-        <c:axId val="91466752"/>
+        <c:axId val="82882560"/>
         <c:scaling>
           <c:orientation val="minMax"/>
         </c:scaling>
@@ -27934,7 +27933,7 @@
         <c:majorTickMark val="out"/>
         <c:minorTickMark val="none"/>
         <c:tickLblPos val="nextTo"/>
-        <c:crossAx val="87168064"/>
+        <c:crossAx val="82884096"/>
         <c:crosses val="autoZero"/>
         <c:auto val="1"/>
         <c:lblAlgn val="ctr"/>
@@ -27942,7 +27941,7 @@
         <c:noMultiLvlLbl val="0"/>
       </c:catAx>
       <c:valAx>
-        <c:axId val="87168064"/>
+        <c:axId val="82884096"/>
         <c:scaling>
           <c:orientation val="minMax"/>
         </c:scaling>
@@ -27953,7 +27952,7 @@
         <c:majorTickMark val="out"/>
         <c:minorTickMark val="none"/>
         <c:tickLblPos val="nextTo"/>
-        <c:crossAx val="91466752"/>
+        <c:crossAx val="82882560"/>
         <c:crosses val="autoZero"/>
         <c:crossBetween val="between"/>
       </c:valAx>
@@ -33598,7 +33597,7 @@
           </a:bodyPr>
           <a:lstStyle/>
           <a:p>
-            <a:endParaRPr lang="ja-JP" altLang="en-US"/>
+            <a:endParaRPr lang="ja-JP" altLang="en-US" dirty="0"/>
           </a:p>
         </p:txBody>
       </p:sp>
@@ -33625,8 +33624,8 @@
         </p:blipFill>
         <p:spPr bwMode="auto">
           <a:xfrm>
-            <a:off x="7224168" y="7545987"/>
-            <a:ext cx="6049955" cy="1725624"/>
+            <a:off x="1781965" y="7580167"/>
+            <a:ext cx="4180912" cy="1192519"/>
           </a:xfrm>
           <a:prstGeom prst="rect">
             <a:avLst/>
@@ -33654,7 +33653,7 @@
         <p:spPr bwMode="auto">
           <a:xfrm>
             <a:off x="7364486" y="1533798"/>
-            <a:ext cx="5548313" cy="6507162"/>
+            <a:ext cx="5548313" cy="7659290"/>
           </a:xfrm>
           <a:prstGeom prst="rect">
             <a:avLst/>
@@ -33696,7 +33695,7 @@
               </a:spcBef>
             </a:pPr>
             <a:r>
-              <a:rPr lang="ja-JP" altLang="en-US" sz="2000" b="1" dirty="0"/>
+              <a:rPr lang="ja-JP" altLang="en-US" sz="1600" b="1" dirty="0"/>
               <a:t>☆モデルの概要</a:t>
             </a:r>
           </a:p>
@@ -33710,30 +33709,50 @@
               </a:spcBef>
             </a:pPr>
             <a:r>
-              <a:rPr lang="ja-JP" altLang="en-US" sz="2000" dirty="0"/>
-              <a:t>	</a:t>
-            </a:r>
-            <a:r>
-              <a:rPr lang="ja-JP" altLang="en-US" sz="1800" dirty="0"/>
-              <a:t>（作成したモデルの構成や</a:t>
-            </a:r>
-            <a:r>
-              <a:rPr lang="ja-JP" altLang="en-US" sz="1800" dirty="0" smtClean="0"/>
-              <a:t>読み解き方，記述</a:t>
-            </a:r>
-            <a:r>
-              <a:rPr lang="ja-JP" altLang="en-US" sz="1800" dirty="0"/>
-              <a:t>の特徴などを記入　</a:t>
-            </a:r>
-            <a:r>
-              <a:rPr lang="en-US" altLang="ja-JP" sz="1800" dirty="0"/>
-              <a:t>※</a:t>
-            </a:r>
-            <a:r>
-              <a:rPr lang="ja-JP" altLang="en-US" sz="1800" dirty="0"/>
-              <a:t>モデルの書き方に関する説明として使用してください）</a:t>
-            </a:r>
-            <a:endParaRPr lang="en-US" altLang="ja-JP" sz="1800" dirty="0"/>
+              <a:rPr lang="ja-JP" altLang="en-US" sz="1400" dirty="0"/>
+              <a:t>　　</a:t>
+            </a:r>
+            <a:r>
+              <a:rPr lang="ja-JP" altLang="en-US" sz="1400" dirty="0" smtClean="0"/>
+              <a:t>　</a:t>
+            </a:r>
+            <a:r>
+              <a:rPr lang="ja-JP" altLang="en-US" sz="1400" dirty="0" smtClean="0"/>
+              <a:t>大会における目標に対して要求図を用いて要素を抽出しました。要素の一つとして上がった区間について詳細なドメイン分析を行うことで、下図のパッケージ構成が導き出されました。詳細は</a:t>
+            </a:r>
+            <a:r>
+              <a:rPr lang="en-US" altLang="ja-JP" sz="1400" dirty="0" smtClean="0"/>
+              <a:t>P2</a:t>
+            </a:r>
+            <a:r>
+              <a:rPr lang="ja-JP" altLang="en-US" sz="1400" dirty="0" smtClean="0"/>
+              <a:t>構造を</a:t>
+            </a:r>
+            <a:r>
+              <a:rPr lang="ja-JP" altLang="en-US" sz="1400" dirty="0" smtClean="0"/>
+              <a:t>参照。要求とパッケージ構成にもとづいてクラスを抽出しました。システムの機能である区間の切り替えと駆動という</a:t>
+            </a:r>
+            <a:r>
+              <a:rPr lang="en-US" altLang="ja-JP" sz="1400" dirty="0" smtClean="0"/>
+              <a:t>2</a:t>
+            </a:r>
+            <a:r>
+              <a:rPr lang="ja-JP" altLang="en-US" sz="1400" dirty="0" err="1" smtClean="0"/>
+              <a:t>つの</a:t>
+            </a:r>
+            <a:r>
+              <a:rPr lang="ja-JP" altLang="en-US" sz="1400" dirty="0" smtClean="0"/>
+              <a:t>振る舞いについて並行性設計を踏まえながら分析を行うことで実現可能性を検証しました。詳細はｐ３振る舞い参照。走行戦略においては難所の各区間において、どのような振る舞いをするのかを示し、そこで使われている主な要素技術について、</a:t>
+            </a:r>
+            <a:r>
+              <a:rPr lang="en-US" altLang="ja-JP" sz="1400" dirty="0" smtClean="0"/>
+              <a:t>P.5</a:t>
+            </a:r>
+            <a:r>
+              <a:rPr lang="ja-JP" altLang="en-US" sz="1400" dirty="0" smtClean="0"/>
+              <a:t>で示しました。</a:t>
+            </a:r>
+            <a:endParaRPr lang="en-US" altLang="ja-JP" sz="1400" dirty="0" smtClean="0"/>
           </a:p>
           <a:p>
             <a:pPr marL="481013" indent="-481013" defTabSz="1279525">
@@ -33744,7 +33763,7 @@
                 <a:spcPct val="20000"/>
               </a:spcBef>
             </a:pPr>
-            <a:endParaRPr lang="en-US" altLang="ja-JP" sz="1900" dirty="0"/>
+            <a:endParaRPr lang="en-US" altLang="ja-JP" sz="1200" dirty="0" smtClean="0"/>
           </a:p>
           <a:p>
             <a:pPr marL="481013" indent="-481013" defTabSz="1279525">
@@ -33756,10 +33775,18 @@
               </a:spcBef>
             </a:pPr>
             <a:r>
-              <a:rPr lang="ja-JP" altLang="en-US" sz="2000" b="1" dirty="0"/>
-              <a:t>☆設計思想</a:t>
-            </a:r>
-            <a:endParaRPr lang="en-US" altLang="ja-JP" sz="2000" b="1" dirty="0"/>
+              <a:rPr lang="ja-JP" altLang="en-US" sz="1400" b="1" dirty="0" smtClean="0"/>
+              <a:t>☆</a:t>
+            </a:r>
+            <a:r>
+              <a:rPr lang="ja-JP" altLang="en-US" sz="1400" b="1" dirty="0"/>
+              <a:t>設計</a:t>
+            </a:r>
+            <a:r>
+              <a:rPr lang="ja-JP" altLang="en-US" sz="1400" b="1" dirty="0" smtClean="0"/>
+              <a:t>思想</a:t>
+            </a:r>
+            <a:endParaRPr lang="en-US" altLang="ja-JP" sz="1400" b="1" dirty="0"/>
           </a:p>
           <a:p>
             <a:pPr marL="481013" indent="-481013" defTabSz="1279525">
@@ -33771,65 +33798,58 @@
               </a:spcBef>
             </a:pPr>
             <a:r>
-              <a:rPr lang="en-US" altLang="ja-JP" sz="2300" b="1" dirty="0"/>
+              <a:rPr lang="en-US" altLang="ja-JP" sz="1600" b="1" dirty="0"/>
               <a:t>	</a:t>
             </a:r>
             <a:r>
-              <a:rPr lang="ja-JP" altLang="en-US" sz="1800" dirty="0"/>
-              <a:t>モデルの再利用性の</a:t>
-            </a:r>
-            <a:r>
-              <a:rPr lang="ja-JP" altLang="en-US" sz="1800" dirty="0" smtClean="0"/>
-              <a:t>向上，メッセージ</a:t>
-            </a:r>
-            <a:r>
-              <a:rPr lang="ja-JP" altLang="en-US" sz="1800" dirty="0"/>
-              <a:t>の流れをわかりやすくするために役割を明確にしたパッケージに分割することに</a:t>
-            </a:r>
-            <a:r>
-              <a:rPr lang="ja-JP" altLang="en-US" sz="1800" dirty="0" smtClean="0"/>
-              <a:t>より，設計</a:t>
-            </a:r>
-            <a:r>
-              <a:rPr lang="ja-JP" altLang="en-US" sz="1800" dirty="0"/>
-              <a:t>に一貫性を</a:t>
-            </a:r>
-            <a:r>
-              <a:rPr lang="ja-JP" altLang="en-US" sz="1800" dirty="0" smtClean="0"/>
-              <a:t>持たせました．</a:t>
-            </a:r>
-            <a:r>
-              <a:rPr lang="en-US" altLang="ja-JP" sz="1800" dirty="0"/>
-              <a:t/>
-            </a:r>
-            <a:br>
-              <a:rPr lang="en-US" altLang="ja-JP" sz="1800" dirty="0"/>
-            </a:br>
-            <a:r>
-              <a:rPr lang="ja-JP" altLang="en-US" sz="1800" dirty="0"/>
-              <a:t>ロボットは要は目標値を制御！だから我々は目標値生成の流れに注力</a:t>
-            </a:r>
-            <a:r>
-              <a:rPr lang="ja-JP" altLang="en-US" sz="1800" dirty="0" smtClean="0"/>
-              <a:t>した．目標値</a:t>
-            </a:r>
-            <a:r>
-              <a:rPr lang="ja-JP" altLang="en-US" sz="1800" dirty="0"/>
-              <a:t>から制御量への生成</a:t>
-            </a:r>
-            <a:r>
-              <a:rPr lang="ja-JP" altLang="en-US" sz="1800" dirty="0" smtClean="0"/>
-              <a:t>は，ひとつ</a:t>
-            </a:r>
-            <a:r>
-              <a:rPr lang="ja-JP" altLang="en-US" sz="1800" dirty="0"/>
-              <a:t>のパッケージに</a:t>
-            </a:r>
-            <a:r>
-              <a:rPr lang="ja-JP" altLang="en-US" sz="1800" dirty="0" smtClean="0"/>
-              <a:t>まかせた．</a:t>
-            </a:r>
-            <a:endParaRPr lang="ja-JP" altLang="en-US" sz="1800" dirty="0"/>
+              <a:rPr lang="ja-JP" altLang="en-US" sz="1200" dirty="0" smtClean="0"/>
+              <a:t>パッケージ</a:t>
+            </a:r>
+            <a:r>
+              <a:rPr lang="ja-JP" altLang="en-US" sz="1200" dirty="0" smtClean="0"/>
+              <a:t>分けを開発の初期に行い、最初に立てた方針を意識しながら、設計することにより、モデルに</a:t>
+            </a:r>
+            <a:r>
+              <a:rPr lang="ja-JP" altLang="en-US" sz="1200" dirty="0"/>
+              <a:t>一貫性を</a:t>
+            </a:r>
+            <a:r>
+              <a:rPr lang="ja-JP" altLang="en-US" sz="1200" dirty="0" smtClean="0"/>
+              <a:t>持たせました</a:t>
+            </a:r>
+            <a:r>
+              <a:rPr lang="ja-JP" altLang="en-US" sz="1200" dirty="0" smtClean="0"/>
+              <a:t>．双方向の関連を禁止し、区間の切り替え通知はデザインパターンである</a:t>
+            </a:r>
+            <a:r>
+              <a:rPr lang="en-US" altLang="ja-JP" sz="1200" dirty="0" smtClean="0"/>
+              <a:t>Observer</a:t>
+            </a:r>
+            <a:r>
+              <a:rPr lang="ja-JP" altLang="en-US" sz="1200" dirty="0" smtClean="0"/>
+              <a:t>パターンを拡張した構成を用い</a:t>
+            </a:r>
+            <a:r>
+              <a:rPr lang="ja-JP" altLang="en-US" sz="1200" dirty="0" smtClean="0"/>
+              <a:t>ることで</a:t>
+            </a:r>
+            <a:r>
+              <a:rPr lang="ja-JP" altLang="en-US" sz="1200" dirty="0" smtClean="0"/>
+              <a:t>双方向の関連を避けました。</a:t>
+            </a:r>
+            <a:r>
+              <a:rPr lang="en-US" altLang="ja-JP" sz="1200" dirty="0" smtClean="0"/>
+              <a:t>P</a:t>
+            </a:r>
+            <a:r>
+              <a:rPr lang="en-US" altLang="ja-JP" sz="1200" dirty="0" smtClean="0"/>
+              <a:t>2.</a:t>
+            </a:r>
+            <a:r>
+              <a:rPr lang="ja-JP" altLang="en-US" sz="1200" dirty="0" smtClean="0"/>
+              <a:t>区間のドメイン分析で記述したように、細かい区間ごとに分けることで、区間ごとにチームで分担して開発することにより開発スピードを上げ、結合は区間をつなげることのみで行えるので非常に容易になりました。</a:t>
+            </a:r>
+            <a:endParaRPr lang="en-US" altLang="ja-JP" sz="1200" dirty="0"/>
           </a:p>
           <a:p>
             <a:pPr marL="481013" indent="-481013" defTabSz="1279525">
@@ -33840,7 +33860,14 @@
                 <a:spcPct val="20000"/>
               </a:spcBef>
             </a:pPr>
-            <a:endParaRPr lang="en-US" altLang="ja-JP" sz="1900" dirty="0"/>
+            <a:r>
+              <a:rPr lang="ja-JP" altLang="en-US" sz="1400" b="1" dirty="0" smtClean="0"/>
+              <a:t>☆</a:t>
+            </a:r>
+            <a:r>
+              <a:rPr lang="ja-JP" altLang="en-US" sz="1400" b="1" dirty="0"/>
+              <a:t>モデルのここに注目！</a:t>
+            </a:r>
           </a:p>
           <a:p>
             <a:pPr marL="481013" indent="-481013" defTabSz="1279525">
@@ -33852,9 +33879,49 @@
               </a:spcBef>
             </a:pPr>
             <a:r>
-              <a:rPr lang="ja-JP" altLang="en-US" sz="2000" b="1" dirty="0"/>
-              <a:t>☆モデルのここに注目！</a:t>
-            </a:r>
+              <a:rPr lang="ja-JP" altLang="en-US" sz="1200" dirty="0"/>
+              <a:t>	</a:t>
+            </a:r>
+            <a:r>
+              <a:rPr lang="ja-JP" altLang="en-US" sz="1200" dirty="0" smtClean="0"/>
+              <a:t>　</a:t>
+            </a:r>
+            <a:r>
+              <a:rPr lang="en-US" altLang="ja-JP" sz="1200" dirty="0" smtClean="0"/>
+              <a:t>ET</a:t>
+            </a:r>
+            <a:r>
+              <a:rPr lang="ja-JP" altLang="en-US" sz="1200" dirty="0"/>
+              <a:t>ロボコンはコースを分割した区間の</a:t>
+            </a:r>
+            <a:r>
+              <a:rPr lang="ja-JP" altLang="en-US" sz="1200" dirty="0" smtClean="0"/>
+              <a:t>連続．その</a:t>
+            </a:r>
+            <a:r>
+              <a:rPr lang="ja-JP" altLang="en-US" sz="1200" dirty="0"/>
+              <a:t>区間に応じたパラメータを設計すれば完走することが</a:t>
+            </a:r>
+            <a:r>
+              <a:rPr lang="ja-JP" altLang="en-US" sz="1200" dirty="0" smtClean="0"/>
+              <a:t>できる．その</a:t>
+            </a:r>
+            <a:r>
+              <a:rPr lang="ja-JP" altLang="en-US" sz="1200" dirty="0"/>
+              <a:t>流れを取り出してモデルに</a:t>
+            </a:r>
+            <a:r>
+              <a:rPr lang="ja-JP" altLang="en-US" sz="1200" dirty="0" smtClean="0"/>
+              <a:t>しました．</a:t>
+            </a:r>
+            <a:r>
+              <a:rPr lang="en-US" altLang="ja-JP" sz="1800" dirty="0"/>
+              <a:t/>
+            </a:r>
+            <a:br>
+              <a:rPr lang="en-US" altLang="ja-JP" sz="1800" dirty="0"/>
+            </a:br>
+            <a:endParaRPr lang="en-US" altLang="ja-JP" sz="1600" dirty="0"/>
           </a:p>
           <a:p>
             <a:pPr marL="481013" indent="-481013" defTabSz="1279525">
@@ -33866,45 +33933,14 @@
               </a:spcBef>
             </a:pPr>
             <a:r>
-              <a:rPr lang="ja-JP" altLang="en-US" sz="1800" dirty="0"/>
-              <a:t>	</a:t>
-            </a:r>
-            <a:r>
-              <a:rPr lang="en-US" altLang="ja-JP" sz="1800" dirty="0"/>
-              <a:t>ET</a:t>
-            </a:r>
-            <a:r>
-              <a:rPr lang="ja-JP" altLang="en-US" sz="1800" dirty="0"/>
-              <a:t>ロボコンはコースを分割した区間の</a:t>
-            </a:r>
-            <a:r>
-              <a:rPr lang="ja-JP" altLang="en-US" sz="1800" dirty="0" smtClean="0"/>
-              <a:t>連続．その</a:t>
-            </a:r>
-            <a:r>
-              <a:rPr lang="ja-JP" altLang="en-US" sz="1800" dirty="0"/>
-              <a:t>区間に応じたパラメータを設計すれば完走することが</a:t>
-            </a:r>
-            <a:r>
-              <a:rPr lang="ja-JP" altLang="en-US" sz="1800" dirty="0" smtClean="0"/>
-              <a:t>できる．その</a:t>
-            </a:r>
-            <a:r>
-              <a:rPr lang="ja-JP" altLang="en-US" sz="1800" dirty="0"/>
-              <a:t>流れを取り出してモデルに</a:t>
-            </a:r>
-            <a:r>
-              <a:rPr lang="ja-JP" altLang="en-US" sz="1800" dirty="0" smtClean="0"/>
-              <a:t>しました．</a:t>
-            </a:r>
-            <a:r>
-              <a:rPr lang="en-US" altLang="ja-JP" sz="2300" dirty="0"/>
-              <a:t/>
-            </a:r>
-            <a:br>
-              <a:rPr lang="en-US" altLang="ja-JP" sz="2300" dirty="0"/>
-            </a:br>
-            <a:endParaRPr lang="en-US" altLang="ja-JP" sz="1900" dirty="0"/>
+              <a:rPr lang="ja-JP" altLang="en-US" sz="1600" b="1" dirty="0"/>
+              <a:t>☆追加課題への</a:t>
+            </a:r>
+            <a:r>
+              <a:rPr lang="ja-JP" altLang="en-US" sz="1600" b="1" dirty="0" smtClean="0"/>
+              <a:t>取り組み</a:t>
+            </a:r>
+            <a:endParaRPr lang="en-US" altLang="ja-JP" sz="1600" b="1" dirty="0" smtClean="0"/>
           </a:p>
           <a:p>
             <a:pPr marL="481013" indent="-481013" defTabSz="1279525">
@@ -33916,9 +33952,18 @@
               </a:spcBef>
             </a:pPr>
             <a:r>
-              <a:rPr lang="ja-JP" altLang="en-US" sz="2000" b="1" dirty="0"/>
-              <a:t>☆追加課題への取り組み</a:t>
-            </a:r>
+              <a:rPr lang="ja-JP" altLang="en-US" sz="1600" dirty="0"/>
+              <a:t>並行性</a:t>
+            </a:r>
+            <a:r>
+              <a:rPr lang="ja-JP" altLang="en-US" sz="1600" dirty="0" smtClean="0"/>
+              <a:t>設計・要求モデルについて取り組みました。</a:t>
+            </a:r>
+            <a:r>
+              <a:rPr lang="ja-JP" altLang="en-US" sz="1600" b="1" dirty="0"/>
+              <a:t>　</a:t>
+            </a:r>
+            <a:endParaRPr lang="en-US" altLang="ja-JP" sz="1600" b="1" dirty="0" smtClean="0"/>
           </a:p>
           <a:p>
             <a:pPr marL="481013" indent="-481013" defTabSz="1279525">
@@ -33930,18 +33975,334 @@
               </a:spcBef>
             </a:pPr>
             <a:r>
-              <a:rPr lang="ja-JP" altLang="en-US" sz="2400" dirty="0"/>
-              <a:t>	</a:t>
-            </a:r>
-            <a:r>
-              <a:rPr lang="ja-JP" altLang="en-US" sz="1800" dirty="0"/>
-              <a:t>並行性</a:t>
-            </a:r>
-            <a:r>
-              <a:rPr lang="ja-JP" altLang="en-US" sz="1800" dirty="0" smtClean="0"/>
-              <a:t>設計，要求モデル</a:t>
-            </a:r>
-            <a:endParaRPr lang="ja-JP" altLang="en-US" sz="2300" dirty="0"/>
+              <a:rPr lang="ja-JP" altLang="en-US" sz="1600" b="1" dirty="0" smtClean="0"/>
+              <a:t>・</a:t>
+            </a:r>
+            <a:r>
+              <a:rPr lang="ja-JP" altLang="en-US" sz="1400" dirty="0" smtClean="0"/>
+              <a:t>並行性設計</a:t>
+            </a:r>
+            <a:endParaRPr lang="en-US" altLang="ja-JP" sz="1400" dirty="0" smtClean="0"/>
+          </a:p>
+          <a:p>
+            <a:r>
+              <a:rPr lang="ja-JP" altLang="en-US" sz="1200" dirty="0" smtClean="0">
+                <a:latin typeface="メイリオ" pitchFamily="50" charset="-128"/>
+                <a:ea typeface="メイリオ" pitchFamily="50" charset="-128"/>
+                <a:cs typeface="メイリオ" pitchFamily="50" charset="-128"/>
+              </a:rPr>
+              <a:t>・設計指針</a:t>
+            </a:r>
+            <a:endParaRPr lang="en-US" altLang="ja-JP" sz="1200" dirty="0" smtClean="0">
+              <a:latin typeface="メイリオ" pitchFamily="50" charset="-128"/>
+              <a:ea typeface="メイリオ" pitchFamily="50" charset="-128"/>
+              <a:cs typeface="メイリオ" pitchFamily="50" charset="-128"/>
+            </a:endParaRPr>
+          </a:p>
+          <a:p>
+            <a:r>
+              <a:rPr lang="ja-JP" altLang="en-US" sz="1200" dirty="0" smtClean="0">
+                <a:latin typeface="メイリオ" pitchFamily="50" charset="-128"/>
+                <a:ea typeface="メイリオ" pitchFamily="50" charset="-128"/>
+                <a:cs typeface="メイリオ" pitchFamily="50" charset="-128"/>
+              </a:rPr>
+              <a:t>走行体のバランス動作などのモータの駆動が一番優先するべきことである</a:t>
+            </a:r>
+            <a:r>
+              <a:rPr lang="ja-JP" altLang="en-US" sz="1200" dirty="0" smtClean="0">
+                <a:latin typeface="メイリオ" pitchFamily="50" charset="-128"/>
+                <a:ea typeface="メイリオ" pitchFamily="50" charset="-128"/>
+                <a:cs typeface="メイリオ" pitchFamily="50" charset="-128"/>
+              </a:rPr>
+              <a:t>。それ</a:t>
+            </a:r>
+            <a:r>
+              <a:rPr lang="ja-JP" altLang="en-US" sz="1200" dirty="0" smtClean="0">
+                <a:latin typeface="メイリオ" pitchFamily="50" charset="-128"/>
+                <a:ea typeface="メイリオ" pitchFamily="50" charset="-128"/>
+                <a:cs typeface="メイリオ" pitchFamily="50" charset="-128"/>
+              </a:rPr>
+              <a:t>に対して</a:t>
+            </a:r>
+            <a:r>
+              <a:rPr lang="en-US" altLang="ja-JP" sz="1200" dirty="0" smtClean="0">
+                <a:latin typeface="メイリオ" pitchFamily="50" charset="-128"/>
+                <a:ea typeface="メイリオ" pitchFamily="50" charset="-128"/>
+                <a:cs typeface="メイリオ" pitchFamily="50" charset="-128"/>
+              </a:rPr>
+              <a:t>,</a:t>
+            </a:r>
+            <a:r>
+              <a:rPr lang="ja-JP" altLang="en-US" sz="1200" dirty="0" smtClean="0">
+                <a:latin typeface="メイリオ" pitchFamily="50" charset="-128"/>
+                <a:ea typeface="メイリオ" pitchFamily="50" charset="-128"/>
+                <a:cs typeface="メイリオ" pitchFamily="50" charset="-128"/>
+              </a:rPr>
+              <a:t>区間の切替ははるかに遅い周期でも十分に性能は得られると考えた</a:t>
+            </a:r>
+            <a:r>
+              <a:rPr lang="en-US" altLang="ja-JP" sz="1200" dirty="0" smtClean="0">
+                <a:latin typeface="メイリオ" pitchFamily="50" charset="-128"/>
+                <a:ea typeface="メイリオ" pitchFamily="50" charset="-128"/>
+                <a:cs typeface="メイリオ" pitchFamily="50" charset="-128"/>
+              </a:rPr>
+              <a:t>.</a:t>
+            </a:r>
+            <a:r>
+              <a:rPr lang="ja-JP" altLang="en-US" sz="1200" dirty="0" smtClean="0">
+                <a:latin typeface="メイリオ" pitchFamily="50" charset="-128"/>
+                <a:ea typeface="メイリオ" pitchFamily="50" charset="-128"/>
+                <a:cs typeface="メイリオ" pitchFamily="50" charset="-128"/>
+              </a:rPr>
+              <a:t>よって駆動関連を一番高い優先度のタスクとし、それ以外は駆動よりも優先度が低いタスクとすることで、駆動が確実に必要な周期で</a:t>
+            </a:r>
+            <a:r>
+              <a:rPr lang="ja-JP" altLang="en-US" sz="1200" dirty="0" err="1" smtClean="0">
+                <a:latin typeface="メイリオ" pitchFamily="50" charset="-128"/>
+                <a:ea typeface="メイリオ" pitchFamily="50" charset="-128"/>
+                <a:cs typeface="メイリオ" pitchFamily="50" charset="-128"/>
+              </a:rPr>
+              <a:t>に</a:t>
+            </a:r>
+            <a:r>
+              <a:rPr lang="ja-JP" altLang="en-US" sz="1200" dirty="0" smtClean="0">
+                <a:latin typeface="メイリオ" pitchFamily="50" charset="-128"/>
+                <a:ea typeface="メイリオ" pitchFamily="50" charset="-128"/>
+                <a:cs typeface="メイリオ" pitchFamily="50" charset="-128"/>
+              </a:rPr>
+              <a:t>行われるように設計した。詳細</a:t>
+            </a:r>
+            <a:r>
+              <a:rPr lang="ja-JP" altLang="en-US" sz="1200" dirty="0" smtClean="0">
+                <a:latin typeface="メイリオ" pitchFamily="50" charset="-128"/>
+                <a:ea typeface="メイリオ" pitchFamily="50" charset="-128"/>
+                <a:cs typeface="メイリオ" pitchFamily="50" charset="-128"/>
+              </a:rPr>
+              <a:t>は</a:t>
+            </a:r>
+            <a:r>
+              <a:rPr lang="en-US" altLang="ja-JP" sz="1200" dirty="0" smtClean="0">
+                <a:latin typeface="メイリオ" pitchFamily="50" charset="-128"/>
+                <a:ea typeface="メイリオ" pitchFamily="50" charset="-128"/>
+                <a:cs typeface="メイリオ" pitchFamily="50" charset="-128"/>
+              </a:rPr>
+              <a:t>P.3</a:t>
+            </a:r>
+            <a:r>
+              <a:rPr lang="ja-JP" altLang="en-US" sz="1200" dirty="0" smtClean="0">
+                <a:latin typeface="メイリオ" pitchFamily="50" charset="-128"/>
+                <a:ea typeface="メイリオ" pitchFamily="50" charset="-128"/>
+                <a:cs typeface="メイリオ" pitchFamily="50" charset="-128"/>
+              </a:rPr>
+              <a:t>並行性設計参照</a:t>
+            </a:r>
+            <a:r>
+              <a:rPr lang="en-US" altLang="ja-JP" sz="1200" dirty="0" smtClean="0">
+                <a:latin typeface="メイリオ" pitchFamily="50" charset="-128"/>
+                <a:ea typeface="メイリオ" pitchFamily="50" charset="-128"/>
+                <a:cs typeface="メイリオ" pitchFamily="50" charset="-128"/>
+              </a:rPr>
+              <a:t>.</a:t>
+            </a:r>
+          </a:p>
+          <a:p>
+            <a:r>
+              <a:rPr lang="ja-JP" altLang="en-US" sz="1200" dirty="0">
+                <a:latin typeface="メイリオ" pitchFamily="50" charset="-128"/>
+                <a:ea typeface="メイリオ" pitchFamily="50" charset="-128"/>
+                <a:cs typeface="メイリオ" pitchFamily="50" charset="-128"/>
+              </a:rPr>
+              <a:t>タスク</a:t>
+            </a:r>
+            <a:r>
+              <a:rPr lang="ja-JP" altLang="en-US" sz="1200" dirty="0" smtClean="0">
+                <a:latin typeface="メイリオ" pitchFamily="50" charset="-128"/>
+                <a:ea typeface="メイリオ" pitchFamily="50" charset="-128"/>
+                <a:cs typeface="メイリオ" pitchFamily="50" charset="-128"/>
+              </a:rPr>
+              <a:t>の構造を示すために２つのステレオタイプを用いた</a:t>
+            </a:r>
+            <a:r>
+              <a:rPr lang="en-US" altLang="ja-JP" sz="1200" dirty="0" smtClean="0">
+                <a:latin typeface="メイリオ" pitchFamily="50" charset="-128"/>
+                <a:ea typeface="メイリオ" pitchFamily="50" charset="-128"/>
+                <a:cs typeface="メイリオ" pitchFamily="50" charset="-128"/>
+              </a:rPr>
+              <a:t>.</a:t>
+            </a:r>
+            <a:r>
+              <a:rPr lang="ja-JP" altLang="en-US" sz="1200" dirty="0" smtClean="0">
+                <a:latin typeface="メイリオ" pitchFamily="50" charset="-128"/>
+                <a:ea typeface="メイリオ" pitchFamily="50" charset="-128"/>
+                <a:cs typeface="メイリオ" pitchFamily="50" charset="-128"/>
+              </a:rPr>
+              <a:t>採用する</a:t>
+            </a:r>
+            <a:r>
+              <a:rPr lang="en-US" altLang="ja-JP" sz="1200" dirty="0" smtClean="0">
+                <a:latin typeface="メイリオ" pitchFamily="50" charset="-128"/>
+                <a:ea typeface="メイリオ" pitchFamily="50" charset="-128"/>
+                <a:cs typeface="メイリオ" pitchFamily="50" charset="-128"/>
+              </a:rPr>
+              <a:t>RT</a:t>
+            </a:r>
+            <a:r>
+              <a:rPr lang="en-US" altLang="ja-JP" sz="1200" dirty="0" smtClean="0">
+                <a:latin typeface="メイリオ" pitchFamily="50" charset="-128"/>
+                <a:ea typeface="メイリオ" pitchFamily="50" charset="-128"/>
+                <a:cs typeface="メイリオ" pitchFamily="50" charset="-128"/>
+              </a:rPr>
+              <a:t>OS</a:t>
+            </a:r>
+            <a:r>
+              <a:rPr lang="ja-JP" altLang="en-US" sz="1200" dirty="0" err="1" smtClean="0">
+                <a:latin typeface="メイリオ" pitchFamily="50" charset="-128"/>
+                <a:ea typeface="メイリオ" pitchFamily="50" charset="-128"/>
+                <a:cs typeface="メイリオ" pitchFamily="50" charset="-128"/>
+              </a:rPr>
+              <a:t>の提</a:t>
+            </a:r>
+            <a:r>
+              <a:rPr lang="ja-JP" altLang="en-US" sz="1200" dirty="0" smtClean="0">
+                <a:latin typeface="メイリオ" pitchFamily="50" charset="-128"/>
+                <a:ea typeface="メイリオ" pitchFamily="50" charset="-128"/>
+                <a:cs typeface="メイリオ" pitchFamily="50" charset="-128"/>
+              </a:rPr>
+              <a:t>供する機能を</a:t>
+            </a:r>
+            <a:r>
+              <a:rPr lang="en-US" altLang="ja-JP" sz="1200" dirty="0" err="1" smtClean="0">
+                <a:latin typeface="メイリオ" pitchFamily="50" charset="-128"/>
+                <a:ea typeface="メイリオ" pitchFamily="50" charset="-128"/>
+                <a:cs typeface="メイリオ" pitchFamily="50" charset="-128"/>
+              </a:rPr>
+              <a:t>nxtOSEK</a:t>
+            </a:r>
+            <a:r>
+              <a:rPr lang="en-US" altLang="ja-JP" sz="1200" dirty="0" smtClean="0">
+                <a:latin typeface="メイリオ" pitchFamily="50" charset="-128"/>
+                <a:ea typeface="メイリオ" pitchFamily="50" charset="-128"/>
+                <a:cs typeface="メイリオ" pitchFamily="50" charset="-128"/>
+              </a:rPr>
+              <a:t>,</a:t>
+            </a:r>
+            <a:r>
+              <a:rPr lang="ja-JP" altLang="en-US" sz="1200" dirty="0" smtClean="0">
+                <a:latin typeface="メイリオ" pitchFamily="50" charset="-128"/>
+                <a:ea typeface="メイリオ" pitchFamily="50" charset="-128"/>
+                <a:cs typeface="メイリオ" pitchFamily="50" charset="-128"/>
+              </a:rPr>
+              <a:t>ひとつ</a:t>
+            </a:r>
+            <a:r>
+              <a:rPr lang="ja-JP" altLang="en-US" sz="1200" dirty="0" smtClean="0">
+                <a:latin typeface="メイリオ" pitchFamily="50" charset="-128"/>
+                <a:ea typeface="メイリオ" pitchFamily="50" charset="-128"/>
+                <a:cs typeface="メイリオ" pitchFamily="50" charset="-128"/>
+              </a:rPr>
+              <a:t>ひとつ</a:t>
+            </a:r>
+            <a:r>
+              <a:rPr lang="ja-JP" altLang="en-US" sz="1200" dirty="0" smtClean="0">
+                <a:latin typeface="メイリオ" pitchFamily="50" charset="-128"/>
+                <a:ea typeface="メイリオ" pitchFamily="50" charset="-128"/>
+                <a:cs typeface="メイリオ" pitchFamily="50" charset="-128"/>
+              </a:rPr>
+              <a:t>のタスクを</a:t>
+            </a:r>
+            <a:r>
+              <a:rPr lang="en-US" altLang="ja-JP" sz="1200" dirty="0" smtClean="0">
+                <a:latin typeface="メイリオ" pitchFamily="50" charset="-128"/>
+                <a:ea typeface="メイリオ" pitchFamily="50" charset="-128"/>
+                <a:cs typeface="メイリオ" pitchFamily="50" charset="-128"/>
+              </a:rPr>
+              <a:t>TASK</a:t>
+            </a:r>
+            <a:r>
+              <a:rPr lang="ja-JP" altLang="en-US" sz="1200" dirty="0" smtClean="0">
+                <a:latin typeface="メイリオ" pitchFamily="50" charset="-128"/>
+                <a:ea typeface="メイリオ" pitchFamily="50" charset="-128"/>
+                <a:cs typeface="メイリオ" pitchFamily="50" charset="-128"/>
+              </a:rPr>
+              <a:t>としました</a:t>
+            </a:r>
+            <a:r>
+              <a:rPr lang="en-US" altLang="ja-JP" sz="1200" dirty="0" smtClean="0">
+                <a:latin typeface="メイリオ" pitchFamily="50" charset="-128"/>
+                <a:ea typeface="メイリオ" pitchFamily="50" charset="-128"/>
+                <a:cs typeface="メイリオ" pitchFamily="50" charset="-128"/>
+              </a:rPr>
+              <a:t>.</a:t>
+            </a:r>
+          </a:p>
+          <a:p>
+            <a:endParaRPr lang="en-US" altLang="ja-JP" sz="1200" dirty="0">
+              <a:latin typeface="メイリオ" pitchFamily="50" charset="-128"/>
+              <a:ea typeface="メイリオ" pitchFamily="50" charset="-128"/>
+              <a:cs typeface="メイリオ" pitchFamily="50" charset="-128"/>
+            </a:endParaRPr>
+          </a:p>
+          <a:p>
+            <a:r>
+              <a:rPr lang="ja-JP" altLang="en-US" sz="1200" dirty="0" smtClean="0">
+                <a:latin typeface="メイリオ" pitchFamily="50" charset="-128"/>
+                <a:ea typeface="メイリオ" pitchFamily="50" charset="-128"/>
+                <a:cs typeface="メイリオ" pitchFamily="50" charset="-128"/>
+              </a:rPr>
+              <a:t>・</a:t>
+            </a:r>
+            <a:r>
+              <a:rPr lang="ja-JP" altLang="en-US" sz="1400" dirty="0" smtClean="0">
+                <a:latin typeface="メイリオ" pitchFamily="50" charset="-128"/>
+                <a:ea typeface="メイリオ" pitchFamily="50" charset="-128"/>
+                <a:cs typeface="メイリオ" pitchFamily="50" charset="-128"/>
+              </a:rPr>
+              <a:t>要求モデルについて</a:t>
+            </a:r>
+            <a:endParaRPr lang="en-US" altLang="ja-JP" sz="1400" dirty="0" smtClean="0">
+              <a:latin typeface="メイリオ" pitchFamily="50" charset="-128"/>
+              <a:ea typeface="メイリオ" pitchFamily="50" charset="-128"/>
+              <a:cs typeface="メイリオ" pitchFamily="50" charset="-128"/>
+            </a:endParaRPr>
+          </a:p>
+          <a:p>
+            <a:r>
+              <a:rPr lang="ja-JP" altLang="en-US" sz="1200" dirty="0" smtClean="0">
+                <a:latin typeface="メイリオ" pitchFamily="50" charset="-128"/>
+                <a:ea typeface="メイリオ" pitchFamily="50" charset="-128"/>
+                <a:cs typeface="メイリオ" pitchFamily="50" charset="-128"/>
+              </a:rPr>
+              <a:t>大会における目標について</a:t>
+            </a:r>
+            <a:r>
+              <a:rPr lang="en-US" altLang="ja-JP" sz="1200" dirty="0" err="1" smtClean="0">
+                <a:latin typeface="メイリオ" pitchFamily="50" charset="-128"/>
+                <a:ea typeface="メイリオ" pitchFamily="50" charset="-128"/>
+                <a:cs typeface="メイリオ" pitchFamily="50" charset="-128"/>
+              </a:rPr>
+              <a:t>SysML</a:t>
+            </a:r>
+            <a:r>
+              <a:rPr lang="ja-JP" altLang="en-US" sz="1200" dirty="0" smtClean="0">
+                <a:latin typeface="メイリオ" pitchFamily="50" charset="-128"/>
+                <a:ea typeface="メイリオ" pitchFamily="50" charset="-128"/>
+                <a:cs typeface="メイリオ" pitchFamily="50" charset="-128"/>
+              </a:rPr>
+              <a:t>の要求図を使って分析しました。そこから機能要件、非機能要件を洗い出して、構造、</a:t>
+            </a:r>
+            <a:r>
+              <a:rPr lang="ja-JP" altLang="en-US" sz="1200" dirty="0" smtClean="0">
+                <a:latin typeface="メイリオ" pitchFamily="50" charset="-128"/>
+                <a:ea typeface="メイリオ" pitchFamily="50" charset="-128"/>
+                <a:cs typeface="メイリオ" pitchFamily="50" charset="-128"/>
+              </a:rPr>
+              <a:t>振る舞い、走行戦略で使われる技術要素を導きだしました。</a:t>
+            </a:r>
+            <a:endParaRPr lang="en-US" altLang="ja-JP" sz="1200" dirty="0" smtClean="0">
+              <a:latin typeface="メイリオ" pitchFamily="50" charset="-128"/>
+              <a:ea typeface="メイリオ" pitchFamily="50" charset="-128"/>
+              <a:cs typeface="メイリオ" pitchFamily="50" charset="-128"/>
+            </a:endParaRPr>
           </a:p>
         </p:txBody>
       </p:sp>
@@ -33955,8 +34316,8 @@
         </p:nvSpPr>
         <p:spPr bwMode="auto">
           <a:xfrm>
-            <a:off x="1033463" y="1488234"/>
-            <a:ext cx="5757862" cy="5973763"/>
+            <a:off x="993490" y="1533798"/>
+            <a:ext cx="5757862" cy="7344816"/>
           </a:xfrm>
           <a:prstGeom prst="rect">
             <a:avLst/>
@@ -34003,29 +34364,12 @@
             </a:r>
             <a:r>
               <a:rPr lang="ja-JP" altLang="en-US" sz="2000" b="1" dirty="0"/>
-              <a:t>チーム紹介</a:t>
-            </a:r>
-          </a:p>
-          <a:p>
-            <a:pPr marL="481013" indent="-481013" defTabSz="1279525">
-              <a:lnSpc>
-                <a:spcPct val="80000"/>
-              </a:lnSpc>
-              <a:spcBef>
-                <a:spcPct val="20000"/>
-              </a:spcBef>
-            </a:pPr>
-            <a:endParaRPr lang="en-US" altLang="ja-JP" sz="1800" b="1" dirty="0" smtClean="0"/>
-          </a:p>
-          <a:p>
-            <a:pPr marL="481013" indent="-481013" defTabSz="1279525">
-              <a:lnSpc>
-                <a:spcPct val="80000"/>
-              </a:lnSpc>
-              <a:spcBef>
-                <a:spcPct val="20000"/>
-              </a:spcBef>
-            </a:pPr>
+              <a:t>チーム</a:t>
+            </a:r>
+            <a:r>
+              <a:rPr lang="ja-JP" altLang="en-US" sz="2000" b="1" dirty="0" smtClean="0"/>
+              <a:t>紹介</a:t>
+            </a:r>
             <a:endParaRPr lang="en-US" altLang="ja-JP" sz="1800" b="1" dirty="0"/>
           </a:p>
           <a:p>
@@ -34037,7 +34381,7 @@
                 <a:spcPct val="20000"/>
               </a:spcBef>
             </a:pPr>
-            <a:endParaRPr lang="en-US" altLang="ja-JP" sz="1800" b="1" dirty="0" smtClean="0"/>
+            <a:endParaRPr lang="en-US" altLang="ja-JP" sz="1100" b="1" dirty="0"/>
           </a:p>
           <a:p>
             <a:pPr marL="481013" indent="-481013" defTabSz="1279525">
@@ -34048,18 +34392,43 @@
                 <a:spcPct val="20000"/>
               </a:spcBef>
             </a:pPr>
-            <a:endParaRPr lang="en-US" altLang="ja-JP" sz="1800" b="1" dirty="0"/>
-          </a:p>
-          <a:p>
-            <a:pPr marL="481013" indent="-481013" algn="ctr" defTabSz="1279525">
-              <a:lnSpc>
-                <a:spcPct val="80000"/>
-              </a:lnSpc>
-              <a:spcBef>
-                <a:spcPct val="20000"/>
-              </a:spcBef>
-            </a:pPr>
-            <a:endParaRPr lang="en-US" altLang="ja-JP" sz="1800" dirty="0" smtClean="0"/>
+            <a:r>
+              <a:rPr lang="ja-JP" altLang="en-US" sz="1100" b="1" dirty="0" smtClean="0"/>
+              <a:t>　　　</a:t>
+            </a:r>
+            <a:r>
+              <a:rPr lang="ja-JP" altLang="en-US" sz="1600" b="1" dirty="0" smtClean="0"/>
+              <a:t>　</a:t>
+            </a:r>
+            <a:r>
+              <a:rPr lang="ja-JP" altLang="en-US" sz="1600" dirty="0" smtClean="0"/>
+              <a:t>高専の３年生から７年生（専攻科２年生）７名で</a:t>
+            </a:r>
+            <a:r>
+              <a:rPr lang="ja-JP" altLang="en-US" sz="1600" dirty="0" smtClean="0"/>
+              <a:t>構成幅広い年代のチーム</a:t>
+            </a:r>
+            <a:r>
+              <a:rPr lang="ja-JP" altLang="en-US" sz="1600" dirty="0" smtClean="0"/>
+              <a:t>です</a:t>
+            </a:r>
+            <a:r>
+              <a:rPr lang="ja-JP" altLang="en-US" sz="1600" dirty="0" smtClean="0"/>
+              <a:t>。メンバー</a:t>
+            </a:r>
+            <a:r>
+              <a:rPr lang="ja-JP" altLang="en-US" sz="1600" dirty="0" smtClean="0"/>
+              <a:t>が入院するといったトラブルに見みまわわれながらも、お互いをカバーし合いながら取り組んできました。この大会を通して技術的な面だけで無く</a:t>
+            </a:r>
+            <a:r>
+              <a:rPr lang="ja-JP" altLang="en-US" sz="1600" dirty="0"/>
+              <a:t>常に</a:t>
+            </a:r>
+            <a:r>
+              <a:rPr lang="ja-JP" altLang="en-US" sz="1600" dirty="0" smtClean="0"/>
+              <a:t>なにか得ようと、自らを向上させようという姿勢がありました。こんなチームで大会に望みます。</a:t>
+            </a:r>
+            <a:endParaRPr lang="en-US" altLang="ja-JP" sz="1100" dirty="0"/>
           </a:p>
           <a:p>
             <a:pPr marL="481013" indent="-481013" defTabSz="1279525">
@@ -34071,14 +34440,9 @@
               </a:spcBef>
             </a:pPr>
             <a:r>
-              <a:rPr lang="en-US" altLang="ja-JP" sz="1800" b="1" dirty="0" smtClean="0"/>
+              <a:rPr lang="en-US" altLang="ja-JP" sz="1800" dirty="0" smtClean="0"/>
               <a:t>	</a:t>
             </a:r>
-            <a:r>
-              <a:rPr lang="ja-JP" altLang="en-US" sz="1800" dirty="0" smtClean="0"/>
-              <a:t>Ｓ藤　懸垂系タイ人</a:t>
-            </a:r>
-            <a:endParaRPr lang="en-US" altLang="ja-JP" sz="1800" dirty="0" smtClean="0"/>
           </a:p>
           <a:p>
             <a:pPr marL="481013" indent="-481013" defTabSz="1279525">
@@ -34090,30 +34454,13 @@
               </a:spcBef>
             </a:pPr>
             <a:r>
-              <a:rPr lang="en-US" altLang="ja-JP" sz="1800" dirty="0" smtClean="0"/>
-              <a:t>	</a:t>
-            </a:r>
-            <a:r>
-              <a:rPr lang="ja-JP" altLang="en-US" sz="1800" dirty="0" smtClean="0"/>
-              <a:t>Ｈ</a:t>
-            </a:r>
-            <a:r>
-              <a:rPr lang="ja-JP" altLang="en-US" sz="1800" dirty="0"/>
-              <a:t>間</a:t>
-            </a:r>
-            <a:r>
-              <a:rPr lang="ja-JP" altLang="en-US" sz="1800" dirty="0" smtClean="0"/>
-              <a:t>　スニーキング系タイ人</a:t>
-            </a:r>
-            <a:r>
-              <a:rPr lang="ja-JP" altLang="en-US" sz="1800" dirty="0"/>
-              <a:t>　</a:t>
-            </a:r>
-            <a:r>
-              <a:rPr lang="ja-JP" altLang="en-US" sz="1800" dirty="0" smtClean="0"/>
-              <a:t>　</a:t>
-            </a:r>
-            <a:endParaRPr lang="en-US" altLang="ja-JP" sz="1800" dirty="0" smtClean="0"/>
+              <a:rPr lang="ja-JP" altLang="en-US" sz="1800" b="1" dirty="0" smtClean="0"/>
+              <a:t>☆組込み，そして</a:t>
+            </a:r>
+            <a:r>
+              <a:rPr lang="ja-JP" altLang="en-US" sz="1800" b="1" dirty="0"/>
+              <a:t>モデリングの未来へ一言</a:t>
+            </a:r>
           </a:p>
           <a:p>
             <a:pPr marL="481013" indent="-481013" defTabSz="1279525">
@@ -34125,14 +34472,70 @@
               </a:spcBef>
             </a:pPr>
             <a:r>
-              <a:rPr lang="en-US" altLang="ja-JP" sz="1800" dirty="0" smtClean="0"/>
+              <a:rPr lang="en-US" altLang="ja-JP" sz="1600" dirty="0"/>
               <a:t>	</a:t>
             </a:r>
             <a:r>
-              <a:rPr lang="ja-JP" altLang="en-US" sz="1800" dirty="0" smtClean="0"/>
-              <a:t>Ｎ村　ツボ押し系タイ人</a:t>
-            </a:r>
-            <a:endParaRPr lang="en-US" altLang="ja-JP" sz="1800" dirty="0"/>
+              <a:rPr lang="ja-JP" altLang="en-US" sz="1600" dirty="0" smtClean="0"/>
+              <a:t>　モデリングの根底に流れる重要な考え方のひとつは「抽象化思考」です。これは新しい</a:t>
+            </a:r>
+            <a:r>
+              <a:rPr lang="ja-JP" altLang="en-US" sz="1600" dirty="0"/>
+              <a:t>技術</a:t>
+            </a:r>
+            <a:r>
+              <a:rPr lang="ja-JP" altLang="en-US" sz="1600" dirty="0" smtClean="0"/>
+              <a:t>がどんどん出てくるこの分野でも廃れることなく常に通用する技術です</a:t>
+            </a:r>
+            <a:r>
+              <a:rPr lang="ja-JP" altLang="en-US" sz="1600" dirty="0" smtClean="0"/>
+              <a:t>。組込みシステム</a:t>
+            </a:r>
+            <a:r>
+              <a:rPr lang="ja-JP" altLang="en-US" sz="1600" dirty="0"/>
+              <a:t>が肥大化する</a:t>
+            </a:r>
+            <a:r>
+              <a:rPr lang="ja-JP" altLang="en-US" sz="1600" dirty="0" smtClean="0"/>
+              <a:t>昨今、この</a:t>
+            </a:r>
+            <a:r>
+              <a:rPr lang="ja-JP" altLang="en-US" sz="1600" dirty="0" smtClean="0"/>
+              <a:t>技術を手に入れることは、当然の流れと言えます。若手社会人</a:t>
+            </a:r>
+            <a:r>
+              <a:rPr lang="ja-JP" altLang="en-US" sz="1600" dirty="0" smtClean="0"/>
+              <a:t>や学生が参加するこのコンテストを通してこの武器が広く日本に</a:t>
+            </a:r>
+            <a:r>
+              <a:rPr lang="ja-JP" altLang="en-US" sz="1600" dirty="0" smtClean="0"/>
+              <a:t>普及すれば、</a:t>
+            </a:r>
+            <a:r>
+              <a:rPr lang="ja-JP" altLang="en-US" sz="1600" dirty="0" smtClean="0"/>
+              <a:t>組み込み業界だけ</a:t>
+            </a:r>
+            <a:r>
+              <a:rPr lang="ja-JP" altLang="en-US" sz="1600" dirty="0"/>
+              <a:t>でなく、すべてのエンジニアが</a:t>
+            </a:r>
+            <a:r>
+              <a:rPr lang="ja-JP" altLang="en-US" sz="1600" dirty="0" smtClean="0"/>
+              <a:t>ハッピーに</a:t>
+            </a:r>
+            <a:r>
+              <a:rPr lang="ja-JP" altLang="en-US" sz="1600" dirty="0" smtClean="0"/>
+              <a:t>なれる</a:t>
+            </a:r>
+            <a:r>
+              <a:rPr lang="ja-JP" altLang="en-US" sz="1600" dirty="0"/>
+              <a:t>未来</a:t>
+            </a:r>
+            <a:r>
+              <a:rPr lang="ja-JP" altLang="en-US" sz="1600" dirty="0" smtClean="0"/>
+              <a:t>が待っていると信じております。</a:t>
+            </a:r>
+            <a:endParaRPr lang="ja-JP" altLang="en-US" sz="1600" b="1" dirty="0"/>
           </a:p>
           <a:p>
             <a:pPr marL="481013" indent="-481013" defTabSz="1279525">
@@ -34143,31 +34546,7 @@
                 <a:spcPct val="20000"/>
               </a:spcBef>
             </a:pPr>
-            <a:r>
-              <a:rPr lang="en-US" altLang="ja-JP" sz="1800" dirty="0">
-                <a:latin typeface="+mn-ea"/>
-              </a:rPr>
-              <a:t>	</a:t>
-            </a:r>
-            <a:r>
-              <a:rPr lang="ja-JP" altLang="en-US" sz="1800" dirty="0" smtClean="0"/>
-              <a:t>Ｓ木　</a:t>
-            </a:r>
-            <a:r>
-              <a:rPr lang="ja-JP" altLang="en-US" sz="1800" dirty="0" err="1" smtClean="0">
-                <a:latin typeface="+mn-ea"/>
-              </a:rPr>
-              <a:t>ごろごろあっぷるけ</a:t>
-            </a:r>
-            <a:r>
-              <a:rPr lang="ja-JP" altLang="en-US" sz="1800" dirty="0" smtClean="0">
-                <a:latin typeface="+mn-ea"/>
-              </a:rPr>
-              <a:t>ーき</a:t>
-            </a:r>
-            <a:endParaRPr lang="en-US" altLang="ja-JP" sz="1800" dirty="0" smtClean="0">
-              <a:latin typeface="+mn-ea"/>
-            </a:endParaRPr>
+            <a:endParaRPr lang="ja-JP" altLang="en-US" sz="1600" b="1" dirty="0"/>
           </a:p>
           <a:p>
             <a:pPr marL="481013" indent="-481013" defTabSz="1279525">
@@ -34179,156 +34558,18 @@
               </a:spcBef>
             </a:pPr>
             <a:r>
-              <a:rPr lang="en-US" altLang="ja-JP" sz="1800" dirty="0">
-                <a:latin typeface="+mn-ea"/>
-              </a:rPr>
-              <a:t>	</a:t>
-            </a:r>
-            <a:r>
-              <a:rPr lang="ja-JP" altLang="en-US" sz="1800" dirty="0" smtClean="0">
-                <a:latin typeface="+mn-ea"/>
-              </a:rPr>
-              <a:t>Ｓ部</a:t>
-            </a:r>
-            <a:endParaRPr lang="en-US" altLang="ja-JP" sz="1800" dirty="0" smtClean="0">
-              <a:latin typeface="+mn-ea"/>
-            </a:endParaRPr>
-          </a:p>
-          <a:p>
-            <a:pPr marL="481013" indent="-481013" defTabSz="1279525">
-              <a:lnSpc>
-                <a:spcPct val="80000"/>
-              </a:lnSpc>
-              <a:spcBef>
-                <a:spcPct val="20000"/>
-              </a:spcBef>
-            </a:pPr>
-            <a:r>
-              <a:rPr lang="en-US" altLang="ja-JP" sz="1800" dirty="0">
-                <a:latin typeface="+mn-ea"/>
-              </a:rPr>
-              <a:t>	</a:t>
-            </a:r>
-            <a:r>
-              <a:rPr lang="ja-JP" altLang="en-US" sz="1800" dirty="0" smtClean="0">
-                <a:latin typeface="+mn-ea"/>
-              </a:rPr>
-              <a:t>Ｎ川　</a:t>
-            </a:r>
-            <a:r>
-              <a:rPr lang="en-US" altLang="ja-JP" sz="1800" dirty="0" smtClean="0">
-                <a:latin typeface="+mn-ea"/>
-              </a:rPr>
-              <a:t/>
-            </a:r>
-            <a:br>
-              <a:rPr lang="en-US" altLang="ja-JP" sz="1800" dirty="0" smtClean="0">
-                <a:latin typeface="+mn-ea"/>
-              </a:rPr>
-            </a:br>
-            <a:r>
-              <a:rPr lang="ja-JP" altLang="en-US" sz="1800" dirty="0" smtClean="0">
-                <a:latin typeface="+mn-ea"/>
-              </a:rPr>
-              <a:t>Ｋ池</a:t>
-            </a:r>
-            <a:endParaRPr lang="en-US" altLang="ja-JP" sz="1800" dirty="0" smtClean="0">
-              <a:latin typeface="+mn-ea"/>
-            </a:endParaRPr>
-          </a:p>
-          <a:p>
-            <a:pPr marL="481013" indent="-481013" defTabSz="1279525">
-              <a:lnSpc>
-                <a:spcPct val="80000"/>
-              </a:lnSpc>
-              <a:spcBef>
-                <a:spcPct val="20000"/>
-              </a:spcBef>
-            </a:pPr>
-            <a:endParaRPr lang="en-US" altLang="ja-JP" sz="2000" b="1" dirty="0" smtClean="0"/>
-          </a:p>
-          <a:p>
-            <a:pPr marL="481013" indent="-481013" defTabSz="1279525">
-              <a:lnSpc>
-                <a:spcPct val="80000"/>
-              </a:lnSpc>
-              <a:spcBef>
-                <a:spcPct val="20000"/>
-              </a:spcBef>
-            </a:pPr>
-            <a:r>
-              <a:rPr lang="ja-JP" altLang="en-US" sz="2000" b="1" dirty="0" smtClean="0"/>
-              <a:t>☆組込み，そして</a:t>
-            </a:r>
-            <a:r>
-              <a:rPr lang="ja-JP" altLang="en-US" sz="2000" b="1" dirty="0"/>
-              <a:t>モデリングの未来へ一言</a:t>
-            </a:r>
-          </a:p>
-          <a:p>
-            <a:pPr marL="481013" indent="-481013" defTabSz="1279525">
-              <a:lnSpc>
-                <a:spcPct val="80000"/>
-              </a:lnSpc>
-              <a:spcBef>
-                <a:spcPct val="20000"/>
-              </a:spcBef>
-            </a:pPr>
-            <a:r>
-              <a:rPr lang="en-US" altLang="ja-JP" sz="1800" dirty="0"/>
-              <a:t>	</a:t>
-            </a:r>
-            <a:r>
-              <a:rPr lang="ja-JP" altLang="en-US" sz="1800" dirty="0"/>
-              <a:t>今</a:t>
-            </a:r>
-            <a:r>
-              <a:rPr lang="ja-JP" altLang="en-US" sz="1800" dirty="0" smtClean="0"/>
-              <a:t>や，情報系の学生は授業でモデリングを学ぶようになり，モデリングの重要性がさらに高まっています．就職して幸せな毎日を送るた</a:t>
-            </a:r>
-            <a:r>
-              <a:rPr lang="ja-JP" altLang="en-US" sz="1800" dirty="0"/>
-              <a:t>め</a:t>
-            </a:r>
-            <a:r>
-              <a:rPr lang="ja-JP" altLang="en-US" sz="1800" dirty="0" smtClean="0"/>
-              <a:t>に，モデリングを体得して，未来をつかみ取ります！</a:t>
-            </a:r>
-            <a:endParaRPr lang="en-US" altLang="ja-JP" sz="1800" dirty="0" smtClean="0"/>
-          </a:p>
-          <a:p>
-            <a:pPr marL="481013" indent="-481013" defTabSz="1279525">
-              <a:lnSpc>
-                <a:spcPct val="80000"/>
-              </a:lnSpc>
-              <a:spcBef>
-                <a:spcPct val="20000"/>
-              </a:spcBef>
-            </a:pPr>
-            <a:endParaRPr lang="en-US" altLang="ja-JP" sz="1800" dirty="0"/>
-          </a:p>
-          <a:p>
-            <a:pPr marL="481013" indent="-481013" defTabSz="1279525">
-              <a:lnSpc>
-                <a:spcPct val="80000"/>
-              </a:lnSpc>
-              <a:spcBef>
-                <a:spcPct val="20000"/>
-              </a:spcBef>
-            </a:pPr>
-            <a:r>
-              <a:rPr lang="en-US" altLang="ja-JP" sz="1800" dirty="0" smtClean="0"/>
-              <a:t>/*</a:t>
-            </a:r>
-            <a:r>
-              <a:rPr lang="ja-JP" altLang="en-US" sz="1800" dirty="0" smtClean="0"/>
-              <a:t>モデリングは誰でもできる時代に突入します．そこで求められるのは，</a:t>
-            </a:r>
-            <a:r>
-              <a:rPr lang="en-US" altLang="ja-JP" sz="1800" dirty="0" smtClean="0"/>
-              <a:t>*/</a:t>
-            </a:r>
-            <a:endParaRPr lang="ja-JP" altLang="en-US" sz="1800" b="1" dirty="0"/>
+              <a:rPr lang="ja-JP" altLang="en-US" sz="1800" b="1" dirty="0"/>
+              <a:t>☆コンテストにかける</a:t>
+            </a:r>
+            <a:r>
+              <a:rPr lang="ja-JP" altLang="en-US" sz="1800" b="1" dirty="0" smtClean="0"/>
+              <a:t>意気込み，</a:t>
+            </a:r>
+            <a:r>
+              <a:rPr lang="ja-JP" altLang="en-US" sz="1800" b="1" dirty="0" smtClean="0"/>
+              <a:t>アピール</a:t>
+            </a:r>
+            <a:endParaRPr lang="en-US" altLang="ja-JP" sz="1800" b="1" dirty="0" smtClean="0"/>
           </a:p>
           <a:p>
             <a:pPr marL="481013" indent="-481013" defTabSz="1279525">
@@ -34351,15 +34592,170 @@
               </a:spcBef>
             </a:pPr>
             <a:r>
-              <a:rPr lang="ja-JP" altLang="en-US" sz="2000" b="1" dirty="0"/>
-              <a:t>☆コンテストにかける</a:t>
-            </a:r>
-            <a:r>
-              <a:rPr lang="ja-JP" altLang="en-US" sz="2000" b="1" dirty="0" smtClean="0"/>
-              <a:t>意気込み，アピール</a:t>
-            </a:r>
-            <a:endParaRPr lang="ja-JP" altLang="en-US" sz="2000" b="1" dirty="0"/>
+              <a:rPr lang="en-US" altLang="ja-JP" sz="1800" dirty="0"/>
+              <a:t>	</a:t>
+            </a:r>
+            <a:r>
+              <a:rPr lang="ja-JP" altLang="en-US" sz="1800" dirty="0" smtClean="0"/>
+              <a:t>　</a:t>
+            </a:r>
+            <a:r>
+              <a:rPr lang="ja-JP" altLang="en-US" sz="1600" dirty="0" smtClean="0">
+                <a:latin typeface="+mj-ea"/>
+                <a:ea typeface="+mj-ea"/>
+              </a:rPr>
+              <a:t>昨年</a:t>
+            </a:r>
+            <a:r>
+              <a:rPr lang="ja-JP" altLang="en-US" sz="1600" dirty="0">
+                <a:latin typeface="+mj-ea"/>
+                <a:ea typeface="+mj-ea"/>
+              </a:rPr>
+              <a:t>果たせなかった悲願の全国大会出場</a:t>
+            </a:r>
+            <a:r>
+              <a:rPr lang="ja-JP" altLang="en-US" sz="1600" dirty="0" smtClean="0">
+                <a:latin typeface="+mj-ea"/>
+                <a:ea typeface="+mj-ea"/>
+              </a:rPr>
+              <a:t>を</a:t>
+            </a:r>
+            <a:r>
+              <a:rPr lang="en-US" altLang="ja-JP" sz="1600" dirty="0" smtClean="0">
+                <a:latin typeface="+mj-ea"/>
+                <a:ea typeface="+mj-ea"/>
+              </a:rPr>
+              <a:t/>
+            </a:r>
+            <a:br>
+              <a:rPr lang="en-US" altLang="ja-JP" sz="1600" dirty="0" smtClean="0">
+                <a:latin typeface="+mj-ea"/>
+                <a:ea typeface="+mj-ea"/>
+              </a:rPr>
+            </a:br>
+            <a:r>
+              <a:rPr lang="ja-JP" altLang="en-US" sz="1600" dirty="0">
+                <a:latin typeface="+mj-ea"/>
+                <a:ea typeface="+mj-ea"/>
+              </a:rPr>
+              <a:t>果たします</a:t>
+            </a:r>
+            <a:r>
+              <a:rPr lang="ja-JP" altLang="en-US" sz="1600" dirty="0" smtClean="0">
+                <a:latin typeface="+mj-ea"/>
+                <a:ea typeface="+mj-ea"/>
+              </a:rPr>
+              <a:t>！！</a:t>
+            </a:r>
+            <a:r>
+              <a:rPr lang="en-US" altLang="ja-JP" sz="1600" dirty="0" smtClean="0">
+                <a:latin typeface="+mj-ea"/>
+                <a:ea typeface="+mj-ea"/>
+              </a:rPr>
+              <a:t/>
+            </a:r>
+            <a:br>
+              <a:rPr lang="en-US" altLang="ja-JP" sz="1600" dirty="0" smtClean="0">
+                <a:latin typeface="+mj-ea"/>
+                <a:ea typeface="+mj-ea"/>
+              </a:rPr>
+            </a:br>
+            <a:r>
+              <a:rPr lang="ja-JP" altLang="en-US" sz="1600" dirty="0" smtClean="0">
+                <a:latin typeface="+mj-ea"/>
+                <a:ea typeface="+mj-ea"/>
+              </a:rPr>
+              <a:t>高専で</a:t>
+            </a:r>
+            <a:r>
+              <a:rPr lang="en-US" altLang="ja-JP" sz="1600" dirty="0" smtClean="0">
+                <a:latin typeface="+mj-ea"/>
+                <a:ea typeface="+mj-ea"/>
+              </a:rPr>
+              <a:t>15</a:t>
+            </a:r>
+            <a:r>
+              <a:rPr lang="ja-JP" altLang="en-US" sz="1600" dirty="0" smtClean="0">
+                <a:latin typeface="+mj-ea"/>
+                <a:ea typeface="+mj-ea"/>
+              </a:rPr>
+              <a:t>歳から受けた教育をベースにした高専生</a:t>
+            </a:r>
+            <a:r>
+              <a:rPr lang="ja-JP" altLang="en-US" sz="1600" dirty="0">
+                <a:latin typeface="+mj-ea"/>
+                <a:ea typeface="+mj-ea"/>
+              </a:rPr>
+              <a:t>の実力</a:t>
+            </a:r>
+            <a:r>
+              <a:rPr lang="ja-JP" altLang="en-US" sz="1600" dirty="0" smtClean="0">
+                <a:latin typeface="+mj-ea"/>
+                <a:ea typeface="+mj-ea"/>
+              </a:rPr>
+              <a:t>をお見せ</a:t>
+            </a:r>
+            <a:r>
+              <a:rPr lang="ja-JP" altLang="en-US" sz="1600" dirty="0" smtClean="0">
+                <a:latin typeface="+mj-ea"/>
+                <a:ea typeface="+mj-ea"/>
+              </a:rPr>
+              <a:t>します</a:t>
+            </a:r>
+            <a:r>
+              <a:rPr lang="ja-JP" altLang="en-US" sz="1600" dirty="0">
+                <a:latin typeface="+mj-ea"/>
+                <a:ea typeface="+mj-ea"/>
+              </a:rPr>
+              <a:t>！</a:t>
+            </a:r>
+            <a:endParaRPr lang="en-US" altLang="ja-JP" sz="1900" dirty="0"/>
           </a:p>
+        </p:txBody>
+      </p:sp>
+      <p:sp>
+        <p:nvSpPr>
+          <p:cNvPr id="10" name="Rectangle 4"/>
+          <p:cNvSpPr>
+            <a:spLocks noChangeArrowheads="1"/>
+          </p:cNvSpPr>
+          <p:nvPr/>
+        </p:nvSpPr>
+        <p:spPr bwMode="auto">
+          <a:xfrm>
+            <a:off x="5639992" y="1272208"/>
+            <a:ext cx="1595487" cy="2568054"/>
+          </a:xfrm>
+          <a:prstGeom prst="rect">
+            <a:avLst/>
+          </a:prstGeom>
+          <a:noFill/>
+          <a:ln>
+            <a:noFill/>
+          </a:ln>
+          <a:extLst>
+            <a:ext uri="{909E8E84-426E-40DD-AFC4-6F175D3DCCD1}">
+              <a14:hiddenFill xmlns:a14="http://schemas.microsoft.com/office/drawing/2010/main">
+                <a:solidFill>
+                  <a:srgbClr val="FFFFFF"/>
+                </a:solidFill>
+              </a14:hiddenFill>
+            </a:ext>
+            <a:ext uri="{91240B29-F687-4F45-9708-019B960494DF}">
+              <a14:hiddenLine xmlns:a14="http://schemas.microsoft.com/office/drawing/2010/main" w="9525">
+                <a:solidFill>
+                  <a:srgbClr val="000000"/>
+                </a:solidFill>
+                <a:miter lim="800000"/>
+                <a:headEnd/>
+                <a:tailEnd/>
+              </a14:hiddenLine>
+            </a:ext>
+          </a:extLst>
+        </p:spPr>
+        <p:txBody>
+          <a:bodyPr lIns="127998" tIns="63999" rIns="127998" bIns="63999"/>
+          <a:lstStyle/>
           <a:p>
             <a:pPr marL="481013" indent="-481013" defTabSz="1279525">
               <a:lnSpc>
@@ -34369,234 +34765,39 @@
                 <a:spcPct val="20000"/>
               </a:spcBef>
             </a:pPr>
-            <a:r>
-              <a:rPr lang="en-US" altLang="ja-JP" sz="1900" dirty="0"/>
-              <a:t>	</a:t>
-            </a:r>
-            <a:r>
-              <a:rPr lang="ja-JP" altLang="en-US" sz="1800" dirty="0">
-                <a:latin typeface="+mj-ea"/>
-                <a:ea typeface="+mj-ea"/>
-              </a:rPr>
-              <a:t>昨年果たせなかった悲願の全国大会出場</a:t>
-            </a:r>
-            <a:r>
-              <a:rPr lang="ja-JP" altLang="en-US" sz="1800" dirty="0" smtClean="0">
-                <a:latin typeface="+mj-ea"/>
-                <a:ea typeface="+mj-ea"/>
-              </a:rPr>
-              <a:t>を</a:t>
-            </a:r>
-            <a:r>
-              <a:rPr lang="en-US" altLang="ja-JP" sz="1800" dirty="0" smtClean="0">
-                <a:latin typeface="+mj-ea"/>
-                <a:ea typeface="+mj-ea"/>
-              </a:rPr>
-              <a:t/>
-            </a:r>
-            <a:br>
-              <a:rPr lang="en-US" altLang="ja-JP" sz="1800" dirty="0" smtClean="0">
-                <a:latin typeface="+mj-ea"/>
-                <a:ea typeface="+mj-ea"/>
-              </a:rPr>
-            </a:br>
-            <a:r>
-              <a:rPr lang="ja-JP" altLang="en-US" sz="1800" dirty="0" smtClean="0">
-                <a:latin typeface="+mj-ea"/>
-                <a:ea typeface="+mj-ea"/>
-              </a:rPr>
-              <a:t>もぎ取る</a:t>
-            </a:r>
-            <a:r>
-              <a:rPr lang="ja-JP" altLang="en-US" sz="1800" dirty="0">
-                <a:latin typeface="+mj-ea"/>
-                <a:ea typeface="+mj-ea"/>
-              </a:rPr>
-              <a:t>！</a:t>
-            </a:r>
-            <a:r>
-              <a:rPr lang="ja-JP" altLang="en-US" sz="1800" dirty="0" smtClean="0">
-                <a:latin typeface="+mj-ea"/>
-                <a:ea typeface="+mj-ea"/>
-              </a:rPr>
-              <a:t>！</a:t>
-            </a:r>
-            <a:r>
-              <a:rPr lang="en-US" altLang="ja-JP" sz="1800" dirty="0" smtClean="0">
-                <a:latin typeface="+mj-ea"/>
-                <a:ea typeface="+mj-ea"/>
-              </a:rPr>
-              <a:t/>
-            </a:r>
-            <a:br>
-              <a:rPr lang="en-US" altLang="ja-JP" sz="1800" dirty="0" smtClean="0">
-                <a:latin typeface="+mj-ea"/>
-                <a:ea typeface="+mj-ea"/>
-              </a:rPr>
-            </a:br>
-            <a:r>
-              <a:rPr lang="ja-JP" altLang="en-US" sz="1800" dirty="0" smtClean="0">
-                <a:latin typeface="+mj-ea"/>
-                <a:ea typeface="+mj-ea"/>
-              </a:rPr>
-              <a:t>高専生</a:t>
-            </a:r>
-            <a:r>
-              <a:rPr lang="ja-JP" altLang="en-US" sz="1800" dirty="0">
-                <a:latin typeface="+mj-ea"/>
-                <a:ea typeface="+mj-ea"/>
-              </a:rPr>
-              <a:t>の実力をお見せします</a:t>
-            </a:r>
-            <a:r>
-              <a:rPr lang="ja-JP" altLang="en-US" sz="1800" dirty="0" smtClean="0">
-                <a:latin typeface="+mj-ea"/>
-                <a:ea typeface="+mj-ea"/>
-              </a:rPr>
-              <a:t>☆</a:t>
-            </a:r>
-            <a:r>
-              <a:rPr lang="en-US" altLang="ja-JP" sz="1800" dirty="0" smtClean="0">
-                <a:latin typeface="+mj-ea"/>
-                <a:ea typeface="+mj-ea"/>
-              </a:rPr>
-              <a:t/>
-            </a:r>
-            <a:br>
-              <a:rPr lang="en-US" altLang="ja-JP" sz="1800" dirty="0" smtClean="0">
-                <a:latin typeface="+mj-ea"/>
-                <a:ea typeface="+mj-ea"/>
-              </a:rPr>
-            </a:br>
-            <a:r>
-              <a:rPr lang="ja-JP" altLang="en-US" sz="1800" dirty="0" smtClean="0">
-                <a:latin typeface="+mj-ea"/>
-                <a:ea typeface="+mj-ea"/>
-              </a:rPr>
-              <a:t>こん</a:t>
-            </a:r>
-            <a:r>
-              <a:rPr lang="ja-JP" altLang="en-US" sz="1800" dirty="0" err="1">
-                <a:latin typeface="+mj-ea"/>
-                <a:ea typeface="+mj-ea"/>
-              </a:rPr>
-              <a:t>ぶは</a:t>
-            </a:r>
-            <a:r>
-              <a:rPr lang="ja-JP" altLang="en-US" sz="1800" dirty="0">
-                <a:latin typeface="+mj-ea"/>
-                <a:ea typeface="+mj-ea"/>
-              </a:rPr>
-              <a:t>頭の栄養！！いいこんぶ！</a:t>
-            </a:r>
-            <a:r>
-              <a:rPr lang="en-US" altLang="ja-JP" sz="1900" dirty="0"/>
-              <a:t>	</a:t>
-            </a:r>
+            <a:endParaRPr lang="en-US" altLang="ja-JP" sz="1400" dirty="0" smtClean="0">
+              <a:latin typeface="メイリオ" pitchFamily="50" charset="-128"/>
+              <a:ea typeface="メイリオ" pitchFamily="50" charset="-128"/>
+              <a:cs typeface="メイリオ" pitchFamily="50" charset="-128"/>
+            </a:endParaRPr>
           </a:p>
         </p:txBody>
       </p:sp>
       <p:pic>
         <p:nvPicPr>
-          <p:cNvPr id="4100" name="Picture 4" descr="https://fbcdn-sphotos-b-a.akamaihd.net/hphotos-ak-ash4/251820_473882899290853_1029388214_n.jpg"/>
+          <p:cNvPr id="11" name="Picture 5"/>
           <p:cNvPicPr>
             <a:picLocks noChangeAspect="1" noChangeArrowheads="1"/>
           </p:cNvPicPr>
           <p:nvPr/>
         </p:nvPicPr>
-        <p:blipFill rotWithShape="1">
-          <a:blip r:embed="rId3" cstate="print">
+        <p:blipFill>
+          <a:blip r:embed="rId3">
             <a:extLst>
               <a:ext uri="{28A0092B-C50C-407E-A947-70E740481C1C}">
                 <a14:useLocalDpi xmlns:a14="http://schemas.microsoft.com/office/drawing/2010/main" val="0"/>
               </a:ext>
             </a:extLst>
           </a:blip>
-          <a:srcRect l="23281"/>
-          <a:stretch/>
+          <a:srcRect/>
+          <a:stretch>
+            <a:fillRect/>
+          </a:stretch>
         </p:blipFill>
         <p:spPr bwMode="auto">
           <a:xfrm>
-            <a:off x="4272329" y="1920282"/>
-            <a:ext cx="1139231" cy="1113705"/>
-          </a:xfrm>
-          <a:prstGeom prst="rect">
-            <a:avLst/>
-          </a:prstGeom>
-          <a:noFill/>
-          <a:extLst>
-            <a:ext uri="{909E8E84-426E-40DD-AFC4-6F175D3DCCD1}">
-              <a14:hiddenFill xmlns:a14="http://schemas.microsoft.com/office/drawing/2010/main">
-                <a:solidFill>
-                  <a:srgbClr val="FFFFFF"/>
-                </a:solidFill>
-              </a14:hiddenFill>
-            </a:ext>
-          </a:extLst>
-        </p:spPr>
-      </p:pic>
-      <p:pic>
-        <p:nvPicPr>
-          <p:cNvPr id="4102" name="Picture 6" descr="https://fbcdn-sphotos-a-a.akamaihd.net/hphotos-ak-snc7/405255_473882925957517_1807538039_n.jpg"/>
-          <p:cNvPicPr>
-            <a:picLocks noChangeAspect="1" noChangeArrowheads="1"/>
-          </p:cNvPicPr>
-          <p:nvPr/>
-        </p:nvPicPr>
-        <p:blipFill rotWithShape="1">
-          <a:blip r:embed="rId4" cstate="print">
-            <a:extLst>
-              <a:ext uri="{28A0092B-C50C-407E-A947-70E740481C1C}">
-                <a14:useLocalDpi xmlns:a14="http://schemas.microsoft.com/office/drawing/2010/main" val="0"/>
-              </a:ext>
-            </a:extLst>
-          </a:blip>
-          <a:srcRect l="23281"/>
-          <a:stretch/>
-        </p:blipFill>
-        <p:spPr bwMode="auto">
-          <a:xfrm>
-            <a:off x="1993868" y="1920283"/>
-            <a:ext cx="1139230" cy="1113705"/>
-          </a:xfrm>
-          <a:prstGeom prst="rect">
-            <a:avLst/>
-          </a:prstGeom>
-          <a:noFill/>
-          <a:extLst>
-            <a:ext uri="{909E8E84-426E-40DD-AFC4-6F175D3DCCD1}">
-              <a14:hiddenFill xmlns:a14="http://schemas.microsoft.com/office/drawing/2010/main">
-                <a:solidFill>
-                  <a:srgbClr val="FFFFFF"/>
-                </a:solidFill>
-              </a14:hiddenFill>
-            </a:ext>
-          </a:extLst>
-        </p:spPr>
-      </p:pic>
-      <p:pic>
-        <p:nvPicPr>
-          <p:cNvPr id="4103" name="Picture 7"/>
-          <p:cNvPicPr>
-            <a:picLocks noChangeAspect="1" noChangeArrowheads="1"/>
-          </p:cNvPicPr>
-          <p:nvPr/>
-        </p:nvPicPr>
-        <p:blipFill rotWithShape="1">
-          <a:blip r:embed="rId5" cstate="print">
-            <a:extLst>
-              <a:ext uri="{28A0092B-C50C-407E-A947-70E740481C1C}">
-                <a14:useLocalDpi xmlns:a14="http://schemas.microsoft.com/office/drawing/2010/main" val="0"/>
-              </a:ext>
-            </a:extLst>
-          </a:blip>
-          <a:srcRect l="23281"/>
-          <a:stretch/>
-        </p:blipFill>
-        <p:spPr bwMode="auto">
-          <a:xfrm>
-            <a:off x="3133097" y="1920283"/>
-            <a:ext cx="1139231" cy="1113705"/>
+            <a:off x="10894091" y="3000400"/>
+            <a:ext cx="2264315" cy="1440160"/>
           </a:xfrm>
           <a:prstGeom prst="rect">
             <a:avLst/>
@@ -34639,7 +34840,7 @@
     </p:spTree>
     <p:extLst>
       <p:ext uri="{BB962C8B-B14F-4D97-AF65-F5344CB8AC3E}">
-        <p14:creationId xmlns:p14="http://schemas.microsoft.com/office/powerpoint/2010/main" val="786607588"/>
+        <p14:creationId xmlns:p14="http://schemas.microsoft.com/office/powerpoint/2010/main" val="1597940874"/>
       </p:ext>
     </p:extLst>
   </p:cSld>
@@ -36560,7 +36761,7 @@
         </p:blipFill>
         <p:spPr bwMode="auto">
           <a:xfrm>
-            <a:off x="2020238" y="1922400"/>
+            <a:off x="2020238" y="1848272"/>
             <a:ext cx="11247568" cy="4006338"/>
           </a:xfrm>
           <a:prstGeom prst="rect">
@@ -38008,7 +38209,23 @@
           <a:p>
             <a:r>
               <a:rPr lang="ja-JP" altLang="en-US" sz="900" dirty="0" smtClean="0"/>
-              <a:t>曲率を用いた旋回量算出を行う．詳しくｐ５要素技術にて</a:t>
+              <a:t>曲率を用いた旋回量算出を行う．</a:t>
+            </a:r>
+            <a:r>
+              <a:rPr lang="ja-JP" altLang="en-US" sz="900" dirty="0" smtClean="0"/>
+              <a:t>詳しくはｐ５</a:t>
+            </a:r>
+            <a:r>
+              <a:rPr lang="ja-JP" altLang="en-US" sz="900" dirty="0" smtClean="0"/>
+              <a:t>要素</a:t>
+            </a:r>
+            <a:r>
+              <a:rPr lang="ja-JP" altLang="en-US" sz="900" dirty="0" smtClean="0"/>
+              <a:t>技術</a:t>
+            </a:r>
+            <a:r>
+              <a:rPr lang="ja-JP" altLang="en-US" sz="900" dirty="0"/>
+              <a:t>参照</a:t>
             </a:r>
             <a:endParaRPr lang="ja-JP" altLang="en-US" sz="900" dirty="0"/>
           </a:p>
@@ -43416,55 +43633,6 @@
           </a:p>
         </p:txBody>
       </p:sp>
-      <p:pic>
-        <p:nvPicPr>
-          <p:cNvPr id="33" name="Picture 3" descr="C:\Users\HOMMA\Documents\ET2012\diagrams\駆動TASK呼び出しシーケンス.emf"/>
-          <p:cNvPicPr>
-            <a:picLocks noChangeAspect="1" noChangeArrowheads="1"/>
-          </p:cNvPicPr>
-          <p:nvPr/>
-        </p:nvPicPr>
-        <p:blipFill rotWithShape="1">
-          <a:blip r:embed="rId2">
-            <a:clrChange>
-              <a:clrFrom>
-                <a:srgbClr val="FFFFFF"/>
-              </a:clrFrom>
-              <a:clrTo>
-                <a:srgbClr val="FFFFFF">
-                  <a:alpha val="0"/>
-                </a:srgbClr>
-              </a:clrTo>
-            </a:clrChange>
-            <a:extLst>
-              <a:ext uri="{28A0092B-C50C-407E-A947-70E740481C1C}">
-                <a14:useLocalDpi xmlns:a14="http://schemas.microsoft.com/office/drawing/2010/main" val="0"/>
-              </a:ext>
-            </a:extLst>
-          </a:blip>
-          <a:srcRect l="21333" t="11500" r="3996" b="10198"/>
-          <a:stretch/>
-        </p:blipFill>
-        <p:spPr bwMode="auto">
-          <a:xfrm>
-            <a:off x="6792119" y="8256984"/>
-            <a:ext cx="1507898" cy="1301880"/>
-          </a:xfrm>
-          <a:prstGeom prst="rect">
-            <a:avLst/>
-          </a:prstGeom>
-          <a:noFill/>
-          <a:extLst>
-            <a:ext uri="{909E8E84-426E-40DD-AFC4-6F175D3DCCD1}">
-              <a14:hiddenFill xmlns:a14="http://schemas.microsoft.com/office/drawing/2010/main">
-                <a:solidFill>
-                  <a:srgbClr val="FFFFFF"/>
-                </a:solidFill>
-              </a14:hiddenFill>
-            </a:ext>
-          </a:extLst>
-        </p:spPr>
-      </p:pic>
       <p:sp>
         <p:nvSpPr>
           <p:cNvPr id="46" name="正方形/長方形 45"/>
@@ -44071,134 +44239,6 @@
           </a:p>
         </p:txBody>
       </p:sp>
-      <p:pic>
-        <p:nvPicPr>
-          <p:cNvPr id="5126" name="Picture 6"/>
-          <p:cNvPicPr>
-            <a:picLocks noChangeAspect="1" noChangeArrowheads="1"/>
-          </p:cNvPicPr>
-          <p:nvPr/>
-        </p:nvPicPr>
-        <p:blipFill>
-          <a:blip r:embed="rId3" cstate="print">
-            <a:extLst>
-              <a:ext uri="{28A0092B-C50C-407E-A947-70E740481C1C}">
-                <a14:useLocalDpi xmlns:a14="http://schemas.microsoft.com/office/drawing/2010/main" val="0"/>
-              </a:ext>
-            </a:extLst>
-          </a:blip>
-          <a:srcRect/>
-          <a:stretch>
-            <a:fillRect/>
-          </a:stretch>
-        </p:blipFill>
-        <p:spPr bwMode="auto">
-          <a:xfrm>
-            <a:off x="8282683" y="8256984"/>
-            <a:ext cx="1476622" cy="1192784"/>
-          </a:xfrm>
-          <a:prstGeom prst="rect">
-            <a:avLst/>
-          </a:prstGeom>
-          <a:noFill/>
-          <a:ln>
-            <a:noFill/>
-          </a:ln>
-          <a:effectLst/>
-          <a:extLst>
-            <a:ext uri="{909E8E84-426E-40DD-AFC4-6F175D3DCCD1}">
-              <a14:hiddenFill xmlns:a14="http://schemas.microsoft.com/office/drawing/2010/main">
-                <a:solidFill>
-                  <a:schemeClr val="accent1"/>
-                </a:solidFill>
-              </a14:hiddenFill>
-            </a:ext>
-            <a:ext uri="{91240B29-F687-4F45-9708-019B960494DF}">
-              <a14:hiddenLine xmlns:a14="http://schemas.microsoft.com/office/drawing/2010/main" w="9525">
-                <a:solidFill>
-                  <a:schemeClr val="tx1"/>
-                </a:solidFill>
-                <a:miter lim="800000"/>
-                <a:headEnd/>
-                <a:tailEnd/>
-              </a14:hiddenLine>
-            </a:ext>
-            <a:ext uri="{AF507438-7753-43E0-B8FC-AC1667EBCBE1}">
-              <a14:hiddenEffects xmlns:a14="http://schemas.microsoft.com/office/drawing/2010/main">
-                <a:effectLst>
-                  <a:outerShdw dist="35921" dir="2700000" algn="ctr" rotWithShape="0">
-                    <a:schemeClr val="bg2"/>
-                  </a:outerShdw>
-                </a:effectLst>
-              </a14:hiddenEffects>
-            </a:ext>
-          </a:extLst>
-        </p:spPr>
-      </p:pic>
-      <p:pic>
-        <p:nvPicPr>
-          <p:cNvPr id="5128" name="Picture 8"/>
-          <p:cNvPicPr>
-            <a:picLocks noChangeAspect="1" noChangeArrowheads="1"/>
-          </p:cNvPicPr>
-          <p:nvPr/>
-        </p:nvPicPr>
-        <p:blipFill>
-          <a:blip r:embed="rId4">
-            <a:extLst>
-              <a:ext uri="{28A0092B-C50C-407E-A947-70E740481C1C}">
-                <a14:useLocalDpi xmlns:a14="http://schemas.microsoft.com/office/drawing/2010/main" val="0"/>
-              </a:ext>
-            </a:extLst>
-          </a:blip>
-          <a:srcRect/>
-          <a:stretch>
-            <a:fillRect/>
-          </a:stretch>
-        </p:blipFill>
-        <p:spPr bwMode="auto">
-          <a:xfrm>
-            <a:off x="9807574" y="6168754"/>
-            <a:ext cx="3663157" cy="3248819"/>
-          </a:xfrm>
-          <a:prstGeom prst="rect">
-            <a:avLst/>
-          </a:prstGeom>
-          <a:noFill/>
-          <a:ln>
-            <a:noFill/>
-          </a:ln>
-          <a:effectLst/>
-          <a:extLst>
-            <a:ext uri="{909E8E84-426E-40DD-AFC4-6F175D3DCCD1}">
-              <a14:hiddenFill xmlns:a14="http://schemas.microsoft.com/office/drawing/2010/main">
-                <a:solidFill>
-                  <a:schemeClr val="accent1"/>
-                </a:solidFill>
-              </a14:hiddenFill>
-            </a:ext>
-            <a:ext uri="{91240B29-F687-4F45-9708-019B960494DF}">
-              <a14:hiddenLine xmlns:a14="http://schemas.microsoft.com/office/drawing/2010/main" w="9525">
-                <a:solidFill>
-                  <a:schemeClr val="tx1"/>
-                </a:solidFill>
-                <a:miter lim="800000"/>
-                <a:headEnd/>
-                <a:tailEnd/>
-              </a14:hiddenLine>
-            </a:ext>
-            <a:ext uri="{AF507438-7753-43E0-B8FC-AC1667EBCBE1}">
-              <a14:hiddenEffects xmlns:a14="http://schemas.microsoft.com/office/drawing/2010/main">
-                <a:effectLst>
-                  <a:outerShdw dist="35921" dir="2700000" algn="ctr" rotWithShape="0">
-                    <a:schemeClr val="bg2"/>
-                  </a:outerShdw>
-                </a:effectLst>
-              </a14:hiddenEffects>
-            </a:ext>
-          </a:extLst>
-        </p:spPr>
-      </p:pic>
       <p:sp>
         <p:nvSpPr>
           <p:cNvPr id="53" name="正方形/長方形 52"/>
@@ -44343,134 +44383,6 @@
       </p:sp>
       <p:pic>
         <p:nvPicPr>
-          <p:cNvPr id="5130" name="Picture 10"/>
-          <p:cNvPicPr>
-            <a:picLocks noChangeAspect="1" noChangeArrowheads="1"/>
-          </p:cNvPicPr>
-          <p:nvPr/>
-        </p:nvPicPr>
-        <p:blipFill>
-          <a:blip r:embed="rId5">
-            <a:extLst>
-              <a:ext uri="{28A0092B-C50C-407E-A947-70E740481C1C}">
-                <a14:useLocalDpi xmlns:a14="http://schemas.microsoft.com/office/drawing/2010/main" val="0"/>
-              </a:ext>
-            </a:extLst>
-          </a:blip>
-          <a:srcRect/>
-          <a:stretch>
-            <a:fillRect/>
-          </a:stretch>
-        </p:blipFill>
-        <p:spPr bwMode="auto">
-          <a:xfrm>
-            <a:off x="7011990" y="5821787"/>
-            <a:ext cx="2576054" cy="2003151"/>
-          </a:xfrm>
-          <a:prstGeom prst="rect">
-            <a:avLst/>
-          </a:prstGeom>
-          <a:noFill/>
-          <a:ln>
-            <a:noFill/>
-          </a:ln>
-          <a:effectLst/>
-          <a:extLst>
-            <a:ext uri="{909E8E84-426E-40DD-AFC4-6F175D3DCCD1}">
-              <a14:hiddenFill xmlns:a14="http://schemas.microsoft.com/office/drawing/2010/main">
-                <a:solidFill>
-                  <a:schemeClr val="accent1"/>
-                </a:solidFill>
-              </a14:hiddenFill>
-            </a:ext>
-            <a:ext uri="{91240B29-F687-4F45-9708-019B960494DF}">
-              <a14:hiddenLine xmlns:a14="http://schemas.microsoft.com/office/drawing/2010/main" w="9525">
-                <a:solidFill>
-                  <a:schemeClr val="tx1"/>
-                </a:solidFill>
-                <a:miter lim="800000"/>
-                <a:headEnd/>
-                <a:tailEnd/>
-              </a14:hiddenLine>
-            </a:ext>
-            <a:ext uri="{AF507438-7753-43E0-B8FC-AC1667EBCBE1}">
-              <a14:hiddenEffects xmlns:a14="http://schemas.microsoft.com/office/drawing/2010/main">
-                <a:effectLst>
-                  <a:outerShdw dist="35921" dir="2700000" algn="ctr" rotWithShape="0">
-                    <a:schemeClr val="bg2"/>
-                  </a:outerShdw>
-                </a:effectLst>
-              </a14:hiddenEffects>
-            </a:ext>
-          </a:extLst>
-        </p:spPr>
-      </p:pic>
-      <p:pic>
-        <p:nvPicPr>
-          <p:cNvPr id="5131" name="Picture 11"/>
-          <p:cNvPicPr>
-            <a:picLocks noChangeAspect="1" noChangeArrowheads="1"/>
-          </p:cNvPicPr>
-          <p:nvPr/>
-        </p:nvPicPr>
-        <p:blipFill>
-          <a:blip r:embed="rId6">
-            <a:extLst>
-              <a:ext uri="{28A0092B-C50C-407E-A947-70E740481C1C}">
-                <a14:useLocalDpi xmlns:a14="http://schemas.microsoft.com/office/drawing/2010/main" val="0"/>
-              </a:ext>
-            </a:extLst>
-          </a:blip>
-          <a:srcRect/>
-          <a:stretch>
-            <a:fillRect/>
-          </a:stretch>
-        </p:blipFill>
-        <p:spPr bwMode="auto">
-          <a:xfrm>
-            <a:off x="817123" y="6166527"/>
-            <a:ext cx="5667012" cy="3170579"/>
-          </a:xfrm>
-          <a:prstGeom prst="rect">
-            <a:avLst/>
-          </a:prstGeom>
-          <a:noFill/>
-          <a:ln>
-            <a:noFill/>
-          </a:ln>
-          <a:effectLst/>
-          <a:extLst>
-            <a:ext uri="{909E8E84-426E-40DD-AFC4-6F175D3DCCD1}">
-              <a14:hiddenFill xmlns:a14="http://schemas.microsoft.com/office/drawing/2010/main">
-                <a:solidFill>
-                  <a:schemeClr val="accent1"/>
-                </a:solidFill>
-              </a14:hiddenFill>
-            </a:ext>
-            <a:ext uri="{91240B29-F687-4F45-9708-019B960494DF}">
-              <a14:hiddenLine xmlns:a14="http://schemas.microsoft.com/office/drawing/2010/main" w="9525">
-                <a:solidFill>
-                  <a:schemeClr val="tx1"/>
-                </a:solidFill>
-                <a:miter lim="800000"/>
-                <a:headEnd/>
-                <a:tailEnd/>
-              </a14:hiddenLine>
-            </a:ext>
-            <a:ext uri="{AF507438-7753-43E0-B8FC-AC1667EBCBE1}">
-              <a14:hiddenEffects xmlns:a14="http://schemas.microsoft.com/office/drawing/2010/main">
-                <a:effectLst>
-                  <a:outerShdw dist="35921" dir="2700000" algn="ctr" rotWithShape="0">
-                    <a:schemeClr val="bg2"/>
-                  </a:outerShdw>
-                </a:effectLst>
-              </a14:hiddenEffects>
-            </a:ext>
-          </a:extLst>
-        </p:spPr>
-      </p:pic>
-      <p:pic>
-        <p:nvPicPr>
           <p:cNvPr id="5132" name="Picture 12"/>
           <p:cNvPicPr>
             <a:picLocks noChangeAspect="1" noChangeArrowheads="1"/>
@@ -44478,7 +44390,7 @@
           <p:nvPr/>
         </p:nvPicPr>
         <p:blipFill>
-          <a:blip r:embed="rId7">
+          <a:blip r:embed="rId2">
             <a:extLst>
               <a:ext uri="{28A0092B-C50C-407E-A947-70E740481C1C}">
                 <a14:useLocalDpi xmlns:a14="http://schemas.microsoft.com/office/drawing/2010/main" val="0"/>
@@ -44620,6 +44532,326 @@
           </a:p>
         </p:txBody>
       </p:sp>
+      <p:pic>
+        <p:nvPicPr>
+          <p:cNvPr id="1026" name="Picture 2"/>
+          <p:cNvPicPr>
+            <a:picLocks noChangeAspect="1" noChangeArrowheads="1"/>
+          </p:cNvPicPr>
+          <p:nvPr/>
+        </p:nvPicPr>
+        <p:blipFill>
+          <a:blip r:embed="rId3" cstate="print">
+            <a:extLst>
+              <a:ext uri="{28A0092B-C50C-407E-A947-70E740481C1C}">
+                <a14:useLocalDpi xmlns:a14="http://schemas.microsoft.com/office/drawing/2010/main" val="0"/>
+              </a:ext>
+            </a:extLst>
+          </a:blip>
+          <a:srcRect/>
+          <a:stretch>
+            <a:fillRect/>
+          </a:stretch>
+        </p:blipFill>
+        <p:spPr bwMode="auto">
+          <a:xfrm>
+            <a:off x="6854501" y="8256986"/>
+            <a:ext cx="1406573" cy="1273456"/>
+          </a:xfrm>
+          <a:prstGeom prst="rect">
+            <a:avLst/>
+          </a:prstGeom>
+          <a:noFill/>
+          <a:ln>
+            <a:noFill/>
+          </a:ln>
+          <a:effectLst/>
+          <a:extLst>
+            <a:ext uri="{909E8E84-426E-40DD-AFC4-6F175D3DCCD1}">
+              <a14:hiddenFill xmlns:a14="http://schemas.microsoft.com/office/drawing/2010/main">
+                <a:solidFill>
+                  <a:schemeClr val="accent1"/>
+                </a:solidFill>
+              </a14:hiddenFill>
+            </a:ext>
+            <a:ext uri="{91240B29-F687-4F45-9708-019B960494DF}">
+              <a14:hiddenLine xmlns:a14="http://schemas.microsoft.com/office/drawing/2010/main" w="9525">
+                <a:solidFill>
+                  <a:schemeClr val="tx1"/>
+                </a:solidFill>
+                <a:miter lim="800000"/>
+                <a:headEnd/>
+                <a:tailEnd/>
+              </a14:hiddenLine>
+            </a:ext>
+            <a:ext uri="{AF507438-7753-43E0-B8FC-AC1667EBCBE1}">
+              <a14:hiddenEffects xmlns:a14="http://schemas.microsoft.com/office/drawing/2010/main">
+                <a:effectLst>
+                  <a:outerShdw dist="35921" dir="2700000" algn="ctr" rotWithShape="0">
+                    <a:schemeClr val="bg2"/>
+                  </a:outerShdw>
+                </a:effectLst>
+              </a14:hiddenEffects>
+            </a:ext>
+          </a:extLst>
+        </p:spPr>
+      </p:pic>
+      <p:pic>
+        <p:nvPicPr>
+          <p:cNvPr id="1027" name="Picture 3"/>
+          <p:cNvPicPr>
+            <a:picLocks noChangeAspect="1" noChangeArrowheads="1"/>
+          </p:cNvPicPr>
+          <p:nvPr/>
+        </p:nvPicPr>
+        <p:blipFill>
+          <a:blip r:embed="rId4">
+            <a:extLst>
+              <a:ext uri="{28A0092B-C50C-407E-A947-70E740481C1C}">
+                <a14:useLocalDpi xmlns:a14="http://schemas.microsoft.com/office/drawing/2010/main" val="0"/>
+              </a:ext>
+            </a:extLst>
+          </a:blip>
+          <a:srcRect/>
+          <a:stretch>
+            <a:fillRect/>
+          </a:stretch>
+        </p:blipFill>
+        <p:spPr bwMode="auto">
+          <a:xfrm>
+            <a:off x="6857068" y="5855137"/>
+            <a:ext cx="2747604" cy="1980849"/>
+          </a:xfrm>
+          <a:prstGeom prst="rect">
+            <a:avLst/>
+          </a:prstGeom>
+          <a:noFill/>
+          <a:ln>
+            <a:noFill/>
+          </a:ln>
+          <a:effectLst/>
+          <a:extLst>
+            <a:ext uri="{909E8E84-426E-40DD-AFC4-6F175D3DCCD1}">
+              <a14:hiddenFill xmlns:a14="http://schemas.microsoft.com/office/drawing/2010/main">
+                <a:solidFill>
+                  <a:schemeClr val="accent1"/>
+                </a:solidFill>
+              </a14:hiddenFill>
+            </a:ext>
+            <a:ext uri="{91240B29-F687-4F45-9708-019B960494DF}">
+              <a14:hiddenLine xmlns:a14="http://schemas.microsoft.com/office/drawing/2010/main" w="9525">
+                <a:solidFill>
+                  <a:schemeClr val="tx1"/>
+                </a:solidFill>
+                <a:miter lim="800000"/>
+                <a:headEnd/>
+                <a:tailEnd/>
+              </a14:hiddenLine>
+            </a:ext>
+            <a:ext uri="{AF507438-7753-43E0-B8FC-AC1667EBCBE1}">
+              <a14:hiddenEffects xmlns:a14="http://schemas.microsoft.com/office/drawing/2010/main">
+                <a:effectLst>
+                  <a:outerShdw dist="35921" dir="2700000" algn="ctr" rotWithShape="0">
+                    <a:schemeClr val="bg2"/>
+                  </a:outerShdw>
+                </a:effectLst>
+              </a14:hiddenEffects>
+            </a:ext>
+          </a:extLst>
+        </p:spPr>
+      </p:pic>
+      <p:pic>
+        <p:nvPicPr>
+          <p:cNvPr id="1030" name="Picture 6"/>
+          <p:cNvPicPr>
+            <a:picLocks noChangeAspect="1" noChangeArrowheads="1"/>
+          </p:cNvPicPr>
+          <p:nvPr/>
+        </p:nvPicPr>
+        <p:blipFill>
+          <a:blip r:embed="rId5" cstate="print">
+            <a:extLst>
+              <a:ext uri="{28A0092B-C50C-407E-A947-70E740481C1C}">
+                <a14:useLocalDpi xmlns:a14="http://schemas.microsoft.com/office/drawing/2010/main" val="0"/>
+              </a:ext>
+            </a:extLst>
+          </a:blip>
+          <a:srcRect/>
+          <a:stretch>
+            <a:fillRect/>
+          </a:stretch>
+        </p:blipFill>
+        <p:spPr bwMode="auto">
+          <a:xfrm>
+            <a:off x="9759305" y="6632319"/>
+            <a:ext cx="3462276" cy="2640191"/>
+          </a:xfrm>
+          <a:prstGeom prst="rect">
+            <a:avLst/>
+          </a:prstGeom>
+          <a:noFill/>
+          <a:ln>
+            <a:noFill/>
+          </a:ln>
+          <a:effectLst/>
+          <a:extLst>
+            <a:ext uri="{909E8E84-426E-40DD-AFC4-6F175D3DCCD1}">
+              <a14:hiddenFill xmlns:a14="http://schemas.microsoft.com/office/drawing/2010/main">
+                <a:solidFill>
+                  <a:schemeClr val="accent1"/>
+                </a:solidFill>
+              </a14:hiddenFill>
+            </a:ext>
+            <a:ext uri="{91240B29-F687-4F45-9708-019B960494DF}">
+              <a14:hiddenLine xmlns:a14="http://schemas.microsoft.com/office/drawing/2010/main" w="9525">
+                <a:solidFill>
+                  <a:schemeClr val="tx1"/>
+                </a:solidFill>
+                <a:miter lim="800000"/>
+                <a:headEnd/>
+                <a:tailEnd/>
+              </a14:hiddenLine>
+            </a:ext>
+            <a:ext uri="{AF507438-7753-43E0-B8FC-AC1667EBCBE1}">
+              <a14:hiddenEffects xmlns:a14="http://schemas.microsoft.com/office/drawing/2010/main">
+                <a:effectLst>
+                  <a:outerShdw dist="35921" dir="2700000" algn="ctr" rotWithShape="0">
+                    <a:schemeClr val="bg2"/>
+                  </a:outerShdw>
+                </a:effectLst>
+              </a14:hiddenEffects>
+            </a:ext>
+          </a:extLst>
+        </p:spPr>
+      </p:pic>
+      <p:pic>
+        <p:nvPicPr>
+          <p:cNvPr id="1031" name="Picture 7"/>
+          <p:cNvPicPr>
+            <a:picLocks noChangeAspect="1" noChangeArrowheads="1"/>
+          </p:cNvPicPr>
+          <p:nvPr/>
+        </p:nvPicPr>
+        <p:blipFill>
+          <a:blip r:embed="rId6">
+            <a:extLst>
+              <a:ext uri="{28A0092B-C50C-407E-A947-70E740481C1C}">
+                <a14:useLocalDpi xmlns:a14="http://schemas.microsoft.com/office/drawing/2010/main" val="0"/>
+              </a:ext>
+            </a:extLst>
+          </a:blip>
+          <a:srcRect/>
+          <a:stretch>
+            <a:fillRect/>
+          </a:stretch>
+        </p:blipFill>
+        <p:spPr bwMode="auto">
+          <a:xfrm>
+            <a:off x="8285443" y="8256986"/>
+            <a:ext cx="1560370" cy="1209622"/>
+          </a:xfrm>
+          <a:prstGeom prst="rect">
+            <a:avLst/>
+          </a:prstGeom>
+          <a:noFill/>
+          <a:ln>
+            <a:noFill/>
+          </a:ln>
+          <a:effectLst/>
+          <a:extLst>
+            <a:ext uri="{909E8E84-426E-40DD-AFC4-6F175D3DCCD1}">
+              <a14:hiddenFill xmlns:a14="http://schemas.microsoft.com/office/drawing/2010/main">
+                <a:solidFill>
+                  <a:schemeClr val="accent1"/>
+                </a:solidFill>
+              </a14:hiddenFill>
+            </a:ext>
+            <a:ext uri="{91240B29-F687-4F45-9708-019B960494DF}">
+              <a14:hiddenLine xmlns:a14="http://schemas.microsoft.com/office/drawing/2010/main" w="9525">
+                <a:solidFill>
+                  <a:schemeClr val="tx1"/>
+                </a:solidFill>
+                <a:miter lim="800000"/>
+                <a:headEnd/>
+                <a:tailEnd/>
+              </a14:hiddenLine>
+            </a:ext>
+            <a:ext uri="{AF507438-7753-43E0-B8FC-AC1667EBCBE1}">
+              <a14:hiddenEffects xmlns:a14="http://schemas.microsoft.com/office/drawing/2010/main">
+                <a:effectLst>
+                  <a:outerShdw dist="35921" dir="2700000" algn="ctr" rotWithShape="0">
+                    <a:schemeClr val="bg2"/>
+                  </a:outerShdw>
+                </a:effectLst>
+              </a14:hiddenEffects>
+            </a:ext>
+          </a:extLst>
+        </p:spPr>
+      </p:pic>
+      <p:pic>
+        <p:nvPicPr>
+          <p:cNvPr id="1032" name="Picture 8"/>
+          <p:cNvPicPr>
+            <a:picLocks noChangeAspect="1" noChangeArrowheads="1"/>
+          </p:cNvPicPr>
+          <p:nvPr/>
+        </p:nvPicPr>
+        <p:blipFill>
+          <a:blip r:embed="rId7" cstate="print">
+            <a:extLst>
+              <a:ext uri="{28A0092B-C50C-407E-A947-70E740481C1C}">
+                <a14:useLocalDpi xmlns:a14="http://schemas.microsoft.com/office/drawing/2010/main" val="0"/>
+              </a:ext>
+            </a:extLst>
+          </a:blip>
+          <a:srcRect/>
+          <a:stretch>
+            <a:fillRect/>
+          </a:stretch>
+        </p:blipFill>
+        <p:spPr bwMode="auto">
+          <a:xfrm>
+            <a:off x="958276" y="6094446"/>
+            <a:ext cx="5131575" cy="3483080"/>
+          </a:xfrm>
+          <a:prstGeom prst="rect">
+            <a:avLst/>
+          </a:prstGeom>
+          <a:noFill/>
+          <a:ln>
+            <a:noFill/>
+          </a:ln>
+          <a:effectLst/>
+          <a:extLst>
+            <a:ext uri="{909E8E84-426E-40DD-AFC4-6F175D3DCCD1}">
+              <a14:hiddenFill xmlns:a14="http://schemas.microsoft.com/office/drawing/2010/main">
+                <a:solidFill>
+                  <a:schemeClr val="accent1"/>
+                </a:solidFill>
+              </a14:hiddenFill>
+            </a:ext>
+            <a:ext uri="{91240B29-F687-4F45-9708-019B960494DF}">
+              <a14:hiddenLine xmlns:a14="http://schemas.microsoft.com/office/drawing/2010/main" w="9525">
+                <a:solidFill>
+                  <a:schemeClr val="tx1"/>
+                </a:solidFill>
+                <a:miter lim="800000"/>
+                <a:headEnd/>
+                <a:tailEnd/>
+              </a14:hiddenLine>
+            </a:ext>
+            <a:ext uri="{AF507438-7753-43E0-B8FC-AC1667EBCBE1}">
+              <a14:hiddenEffects xmlns:a14="http://schemas.microsoft.com/office/drawing/2010/main">
+                <a:effectLst>
+                  <a:outerShdw dist="35921" dir="2700000" algn="ctr" rotWithShape="0">
+                    <a:schemeClr val="bg2"/>
+                  </a:outerShdw>
+                </a:effectLst>
+              </a14:hiddenEffects>
+            </a:ext>
+          </a:extLst>
+        </p:spPr>
+      </p:pic>
       <p:sp>
         <p:nvSpPr>
           <p:cNvPr id="79" name="角丸四角形吹き出し 78"/>
@@ -44633,8 +44865,8 @@
           </a:xfrm>
           <a:prstGeom prst="wedgeRoundRectCallout">
             <a:avLst>
-              <a:gd name="adj1" fmla="val -5637"/>
-              <a:gd name="adj2" fmla="val 113960"/>
+              <a:gd name="adj1" fmla="val -13315"/>
+              <a:gd name="adj2" fmla="val 88936"/>
               <a:gd name="adj3" fmla="val 16667"/>
             </a:avLst>
           </a:prstGeom>
@@ -45230,23 +45462,7 @@
                 <a:ea typeface="メイリオ" pitchFamily="50" charset="-128"/>
                 <a:cs typeface="メイリオ" pitchFamily="50" charset="-128"/>
               </a:rPr>
-              <a:t>段差進入</a:t>
-            </a:r>
-            <a:r>
-              <a:rPr lang="ja-JP" altLang="en-US" sz="1000" dirty="0" smtClean="0">
-                <a:latin typeface="メイリオ" pitchFamily="50" charset="-128"/>
-                <a:ea typeface="メイリオ" pitchFamily="50" charset="-128"/>
-                <a:cs typeface="メイリオ" pitchFamily="50" charset="-128"/>
-              </a:rPr>
-              <a:t>時</a:t>
-            </a:r>
-            <a:r>
-              <a:rPr lang="ja-JP" altLang="en-US" sz="1000" dirty="0" smtClean="0">
-                <a:latin typeface="メイリオ" pitchFamily="50" charset="-128"/>
-                <a:ea typeface="メイリオ" pitchFamily="50" charset="-128"/>
-                <a:cs typeface="メイリオ" pitchFamily="50" charset="-128"/>
-              </a:rPr>
-              <a:t>の速度不足</a:t>
+              <a:t>段差進入時の速度不足</a:t>
             </a:r>
             <a:endParaRPr lang="ja-JP" altLang="en-US" sz="1000" dirty="0">
               <a:latin typeface="メイリオ" pitchFamily="50" charset="-128"/>
@@ -46515,15 +46731,7 @@
                 <a:ea typeface="メイリオ" pitchFamily="50" charset="-128"/>
                 <a:cs typeface="メイリオ" pitchFamily="50" charset="-128"/>
               </a:rPr>
-              <a:t>検知</a:t>
-            </a:r>
-            <a:r>
-              <a:rPr lang="ja-JP" altLang="en-US" sz="1000" dirty="0" smtClean="0">
-                <a:latin typeface="メイリオ" pitchFamily="50" charset="-128"/>
-                <a:ea typeface="メイリオ" pitchFamily="50" charset="-128"/>
-                <a:cs typeface="メイリオ" pitchFamily="50" charset="-128"/>
-              </a:rPr>
-              <a:t>の失敗</a:t>
+              <a:t>検知の失敗</a:t>
             </a:r>
             <a:endParaRPr lang="ja-JP" altLang="en-US" sz="1000" dirty="0">
               <a:latin typeface="メイリオ" pitchFamily="50" charset="-128"/>
@@ -47996,13 +48204,7 @@
               <a:rPr lang="ja-JP" altLang="en-US" sz="1000" dirty="0" smtClean="0">
                 <a:latin typeface="+mn-ea"/>
               </a:rPr>
-              <a:t>・段差進入時の適切な速度の</a:t>
-            </a:r>
-            <a:r>
-              <a:rPr lang="ja-JP" altLang="en-US" sz="1000" dirty="0" smtClean="0">
-                <a:latin typeface="+mn-ea"/>
-              </a:rPr>
-              <a:t>実現</a:t>
+              <a:t>・段差進入時の適切な速度の実現</a:t>
             </a:r>
             <a:endParaRPr lang="en-US" altLang="ja-JP" sz="1000" dirty="0" smtClean="0">
               <a:latin typeface="+mn-ea"/>
@@ -48019,35 +48221,8 @@
               <a:rPr lang="ja-JP" altLang="en-US" sz="900" dirty="0" smtClean="0">
                 <a:latin typeface="+mn-ea"/>
               </a:rPr>
-              <a:t>を上るためには必要がある。そこ</a:t>
-            </a:r>
-            <a:r>
-              <a:rPr lang="ja-JP" altLang="en-US" sz="900" dirty="0" smtClean="0">
-                <a:latin typeface="+mn-ea"/>
-              </a:rPr>
-              <a:t>で倒立制御で用いるジャイロセンサのオフセット値を調節し、車体</a:t>
-            </a:r>
-            <a:r>
-              <a:rPr lang="ja-JP" altLang="en-US" sz="900" dirty="0" smtClean="0">
-                <a:latin typeface="+mn-ea"/>
-              </a:rPr>
-              <a:t>を前傾</a:t>
-            </a:r>
-            <a:r>
-              <a:rPr lang="ja-JP" altLang="en-US" sz="900" dirty="0" smtClean="0">
-                <a:latin typeface="+mn-ea"/>
-              </a:rPr>
-              <a:t>させることで短距離での</a:t>
-            </a:r>
-            <a:r>
-              <a:rPr lang="ja-JP" altLang="en-US" sz="900" dirty="0" smtClean="0">
-                <a:latin typeface="+mn-ea"/>
-              </a:rPr>
-              <a:t>加速を実現した。</a:t>
-            </a:r>
-            <a:endParaRPr lang="ja-JP" altLang="en-US" sz="900" dirty="0" smtClean="0">
-              <a:latin typeface="+mn-ea"/>
-            </a:endParaRPr>
+              <a:t>を上るためには必要がある。そこで倒立制御で用いるジャイロセンサのオフセット値を調節し、車体を前傾させることで短距離での加速を実現した。</a:t>
+            </a:r>
           </a:p>
         </p:txBody>
       </p:sp>
@@ -58356,1344 +58531,6 @@
 </p:sld>
 </file>
 
-<file path=ppt/slides/slide7.xml><?xml version="1.0" encoding="utf-8"?>
-<p:sld xmlns:a="http://schemas.openxmlformats.org/drawingml/2006/main" xmlns:r="http://schemas.openxmlformats.org/officeDocument/2006/relationships" xmlns:p="http://schemas.openxmlformats.org/presentationml/2006/main">
-  <p:cSld>
-    <p:spTree>
-      <p:nvGrpSpPr>
-        <p:cNvPr id="1" name=""/>
-        <p:cNvGrpSpPr/>
-        <p:nvPr/>
-      </p:nvGrpSpPr>
-      <p:grpSpPr>
-        <a:xfrm>
-          <a:off x="0" y="0"/>
-          <a:ext cx="0" cy="0"/>
-          <a:chOff x="0" y="0"/>
-          <a:chExt cx="0" cy="0"/>
-        </a:xfrm>
-      </p:grpSpPr>
-      <p:grpSp>
-        <p:nvGrpSpPr>
-          <p:cNvPr id="2" name="グループ化 1"/>
-          <p:cNvGrpSpPr/>
-          <p:nvPr/>
-        </p:nvGrpSpPr>
-        <p:grpSpPr>
-          <a:xfrm>
-            <a:off x="3043563" y="1632248"/>
-            <a:ext cx="2061948" cy="825674"/>
-            <a:chOff x="1993867" y="1920280"/>
-            <a:chExt cx="3417692" cy="1113706"/>
-          </a:xfrm>
-        </p:grpSpPr>
-        <p:pic>
-          <p:nvPicPr>
-            <p:cNvPr id="4100" name="Picture 4" descr="https://fbcdn-sphotos-b-a.akamaihd.net/hphotos-ak-ash4/251820_473882899290853_1029388214_n.jpg"/>
-            <p:cNvPicPr>
-              <a:picLocks noChangeAspect="1" noChangeArrowheads="1"/>
-            </p:cNvPicPr>
-            <p:nvPr/>
-          </p:nvPicPr>
-          <p:blipFill rotWithShape="1">
-            <a:blip r:embed="rId2" cstate="print">
-              <a:extLst>
-                <a:ext uri="{28A0092B-C50C-407E-A947-70E740481C1C}">
-                  <a14:useLocalDpi xmlns:a14="http://schemas.microsoft.com/office/drawing/2010/main" val="0"/>
-                </a:ext>
-              </a:extLst>
-            </a:blip>
-            <a:srcRect l="23281"/>
-            <a:stretch/>
-          </p:blipFill>
-          <p:spPr bwMode="auto">
-            <a:xfrm>
-              <a:off x="4272328" y="1920280"/>
-              <a:ext cx="1139231" cy="1113705"/>
-            </a:xfrm>
-            <a:prstGeom prst="rect">
-              <a:avLst/>
-            </a:prstGeom>
-            <a:noFill/>
-            <a:extLst>
-              <a:ext uri="{909E8E84-426E-40DD-AFC4-6F175D3DCCD1}">
-                <a14:hiddenFill xmlns:a14="http://schemas.microsoft.com/office/drawing/2010/main">
-                  <a:solidFill>
-                    <a:srgbClr val="FFFFFF"/>
-                  </a:solidFill>
-                </a14:hiddenFill>
-              </a:ext>
-            </a:extLst>
-          </p:spPr>
-        </p:pic>
-        <p:pic>
-          <p:nvPicPr>
-            <p:cNvPr id="4102" name="Picture 6" descr="https://fbcdn-sphotos-a-a.akamaihd.net/hphotos-ak-snc7/405255_473882925957517_1807538039_n.jpg"/>
-            <p:cNvPicPr>
-              <a:picLocks noChangeAspect="1" noChangeArrowheads="1"/>
-            </p:cNvPicPr>
-            <p:nvPr/>
-          </p:nvPicPr>
-          <p:blipFill rotWithShape="1">
-            <a:blip r:embed="rId3" cstate="print">
-              <a:extLst>
-                <a:ext uri="{28A0092B-C50C-407E-A947-70E740481C1C}">
-                  <a14:useLocalDpi xmlns:a14="http://schemas.microsoft.com/office/drawing/2010/main" val="0"/>
-                </a:ext>
-              </a:extLst>
-            </a:blip>
-            <a:srcRect l="23281"/>
-            <a:stretch/>
-          </p:blipFill>
-          <p:spPr bwMode="auto">
-            <a:xfrm>
-              <a:off x="1993867" y="1920281"/>
-              <a:ext cx="1139230" cy="1113705"/>
-            </a:xfrm>
-            <a:prstGeom prst="rect">
-              <a:avLst/>
-            </a:prstGeom>
-            <a:noFill/>
-            <a:extLst>
-              <a:ext uri="{909E8E84-426E-40DD-AFC4-6F175D3DCCD1}">
-                <a14:hiddenFill xmlns:a14="http://schemas.microsoft.com/office/drawing/2010/main">
-                  <a:solidFill>
-                    <a:srgbClr val="FFFFFF"/>
-                  </a:solidFill>
-                </a14:hiddenFill>
-              </a:ext>
-            </a:extLst>
-          </p:spPr>
-        </p:pic>
-        <p:pic>
-          <p:nvPicPr>
-            <p:cNvPr id="4103" name="Picture 7"/>
-            <p:cNvPicPr>
-              <a:picLocks noChangeAspect="1" noChangeArrowheads="1"/>
-            </p:cNvPicPr>
-            <p:nvPr/>
-          </p:nvPicPr>
-          <p:blipFill rotWithShape="1">
-            <a:blip r:embed="rId4" cstate="print">
-              <a:extLst>
-                <a:ext uri="{28A0092B-C50C-407E-A947-70E740481C1C}">
-                  <a14:useLocalDpi xmlns:a14="http://schemas.microsoft.com/office/drawing/2010/main" val="0"/>
-                </a:ext>
-              </a:extLst>
-            </a:blip>
-            <a:srcRect l="23281"/>
-            <a:stretch/>
-          </p:blipFill>
-          <p:spPr bwMode="auto">
-            <a:xfrm>
-              <a:off x="3133097" y="1920281"/>
-              <a:ext cx="1139231" cy="1113705"/>
-            </a:xfrm>
-            <a:prstGeom prst="rect">
-              <a:avLst/>
-            </a:prstGeom>
-            <a:noFill/>
-            <a:ln>
-              <a:noFill/>
-            </a:ln>
-            <a:effectLst/>
-            <a:extLst>
-              <a:ext uri="{909E8E84-426E-40DD-AFC4-6F175D3DCCD1}">
-                <a14:hiddenFill xmlns:a14="http://schemas.microsoft.com/office/drawing/2010/main">
-                  <a:solidFill>
-                    <a:schemeClr val="accent1"/>
-                  </a:solidFill>
-                </a14:hiddenFill>
-              </a:ext>
-              <a:ext uri="{91240B29-F687-4F45-9708-019B960494DF}">
-                <a14:hiddenLine xmlns:a14="http://schemas.microsoft.com/office/drawing/2010/main" w="9525">
-                  <a:solidFill>
-                    <a:schemeClr val="tx1"/>
-                  </a:solidFill>
-                  <a:miter lim="800000"/>
-                  <a:headEnd/>
-                  <a:tailEnd/>
-                </a14:hiddenLine>
-              </a:ext>
-              <a:ext uri="{AF507438-7753-43E0-B8FC-AC1667EBCBE1}">
-                <a14:hiddenEffects xmlns:a14="http://schemas.microsoft.com/office/drawing/2010/main">
-                  <a:effectLst>
-                    <a:outerShdw dist="35921" dir="2700000" algn="ctr" rotWithShape="0">
-                      <a:schemeClr val="bg2"/>
-                    </a:outerShdw>
-                  </a:effectLst>
-                </a14:hiddenEffects>
-              </a:ext>
-            </a:extLst>
-          </p:spPr>
-        </p:pic>
-      </p:grpSp>
-      <p:sp>
-        <p:nvSpPr>
-          <p:cNvPr id="5" name="AutoShape 4" descr="https://mail-attachment.googleusercontent.com/attachment/u/0/?ui=2&amp;ik=877ad86120&amp;view=att&amp;th=1399c23513ebfc40&amp;attid=0.1&amp;disp=inline&amp;realattid=f_h6rzu9dm0&amp;safe=1&amp;zw&amp;saduie=AG9B_P__3uaOvH3J3r6FIq7EvWYr&amp;sadet=1346944401212&amp;sads=pbVCxJMUxmlQQlCN8LctOAYwT_E&amp;sadssc=1"/>
-          <p:cNvSpPr>
-            <a:spLocks noChangeAspect="1" noChangeArrowheads="1"/>
-          </p:cNvSpPr>
-          <p:nvPr/>
-        </p:nvSpPr>
-        <p:spPr bwMode="auto">
-          <a:xfrm>
-            <a:off x="165086" y="-144463"/>
-            <a:ext cx="323434" cy="304801"/>
-          </a:xfrm>
-          <a:prstGeom prst="rect">
-            <a:avLst/>
-          </a:prstGeom>
-          <a:noFill/>
-          <a:extLst>
-            <a:ext uri="{909E8E84-426E-40DD-AFC4-6F175D3DCCD1}">
-              <a14:hiddenFill xmlns:a14="http://schemas.microsoft.com/office/drawing/2010/main">
-                <a:solidFill>
-                  <a:srgbClr val="FFFFFF"/>
-                </a:solidFill>
-              </a14:hiddenFill>
-            </a:ext>
-          </a:extLst>
-        </p:spPr>
-        <p:txBody>
-          <a:bodyPr vert="horz" wrap="square" lIns="91440" tIns="45720" rIns="91440" bIns="45720" numCol="1" anchor="t" anchorCtr="0" compatLnSpc="1">
-            <a:prstTxWarp prst="textNoShape">
-              <a:avLst/>
-            </a:prstTxWarp>
-          </a:bodyPr>
-          <a:lstStyle/>
-          <a:p>
-            <a:endParaRPr lang="ja-JP" altLang="en-US" dirty="0"/>
-          </a:p>
-        </p:txBody>
-      </p:sp>
-      <p:pic>
-        <p:nvPicPr>
-          <p:cNvPr id="6" name="Picture 2" descr="C:\Users\HOMMA\Downloads\ロボコン\ロボコンロゴ3.png"/>
-          <p:cNvPicPr>
-            <a:picLocks noChangeAspect="1" noChangeArrowheads="1"/>
-          </p:cNvPicPr>
-          <p:nvPr/>
-        </p:nvPicPr>
-        <p:blipFill>
-          <a:blip r:embed="rId5" cstate="print">
-            <a:extLst>
-              <a:ext uri="{28A0092B-C50C-407E-A947-70E740481C1C}">
-                <a14:useLocalDpi xmlns:a14="http://schemas.microsoft.com/office/drawing/2010/main" val="0"/>
-              </a:ext>
-            </a:extLst>
-          </a:blip>
-          <a:srcRect/>
-          <a:stretch>
-            <a:fillRect/>
-          </a:stretch>
-        </p:blipFill>
-        <p:spPr bwMode="auto">
-          <a:xfrm>
-            <a:off x="1967583" y="8000571"/>
-            <a:ext cx="4180912" cy="1192519"/>
-          </a:xfrm>
-          <a:prstGeom prst="rect">
-            <a:avLst/>
-          </a:prstGeom>
-          <a:noFill/>
-          <a:extLst>
-            <a:ext uri="{909E8E84-426E-40DD-AFC4-6F175D3DCCD1}">
-              <a14:hiddenFill xmlns:a14="http://schemas.microsoft.com/office/drawing/2010/main">
-                <a:solidFill>
-                  <a:srgbClr val="FFFFFF"/>
-                </a:solidFill>
-              </a14:hiddenFill>
-            </a:ext>
-          </a:extLst>
-        </p:spPr>
-      </p:pic>
-      <p:sp>
-        <p:nvSpPr>
-          <p:cNvPr id="18" name="Rectangle 4"/>
-          <p:cNvSpPr>
-            <a:spLocks noChangeArrowheads="1"/>
-          </p:cNvSpPr>
-          <p:nvPr/>
-        </p:nvSpPr>
-        <p:spPr bwMode="auto">
-          <a:xfrm>
-            <a:off x="7364486" y="1533798"/>
-            <a:ext cx="5548313" cy="7659290"/>
-          </a:xfrm>
-          <a:prstGeom prst="rect">
-            <a:avLst/>
-          </a:prstGeom>
-          <a:noFill/>
-          <a:ln>
-            <a:noFill/>
-          </a:ln>
-          <a:extLst>
-            <a:ext uri="{909E8E84-426E-40DD-AFC4-6F175D3DCCD1}">
-              <a14:hiddenFill xmlns:a14="http://schemas.microsoft.com/office/drawing/2010/main">
-                <a:solidFill>
-                  <a:srgbClr val="FFFFFF"/>
-                </a:solidFill>
-              </a14:hiddenFill>
-            </a:ext>
-            <a:ext uri="{91240B29-F687-4F45-9708-019B960494DF}">
-              <a14:hiddenLine xmlns:a14="http://schemas.microsoft.com/office/drawing/2010/main" w="9525">
-                <a:solidFill>
-                  <a:srgbClr val="000000"/>
-                </a:solidFill>
-                <a:miter lim="800000"/>
-                <a:headEnd/>
-                <a:tailEnd/>
-              </a14:hiddenLine>
-            </a:ext>
-          </a:extLst>
-        </p:spPr>
-        <p:txBody>
-          <a:bodyPr lIns="127998" tIns="63999" rIns="127998" bIns="63999"/>
-          <a:lstStyle/>
-          <a:p>
-            <a:pPr marL="481013" indent="-481013" defTabSz="1279525">
-              <a:lnSpc>
-                <a:spcPct val="80000"/>
-              </a:lnSpc>
-              <a:spcBef>
-                <a:spcPct val="20000"/>
-              </a:spcBef>
-            </a:pPr>
-            <a:r>
-              <a:rPr lang="ja-JP" altLang="en-US" sz="1800" b="1" dirty="0"/>
-              <a:t>☆モデルの概要</a:t>
-            </a:r>
-          </a:p>
-          <a:p>
-            <a:pPr marL="481013" indent="-481013" defTabSz="1279525">
-              <a:lnSpc>
-                <a:spcPct val="80000"/>
-              </a:lnSpc>
-              <a:spcBef>
-                <a:spcPct val="20000"/>
-              </a:spcBef>
-            </a:pPr>
-            <a:r>
-              <a:rPr lang="ja-JP" altLang="en-US" sz="1600" dirty="0"/>
-              <a:t>　　</a:t>
-            </a:r>
-            <a:r>
-              <a:rPr lang="ja-JP" altLang="en-US" sz="1600" dirty="0" smtClean="0"/>
-              <a:t>　</a:t>
-            </a:r>
-            <a:r>
-              <a:rPr lang="ja-JP" altLang="en-US" sz="1400" dirty="0"/>
-              <a:t>複数のモデルに現れ核となる要素に色をつけました。大きく</a:t>
-            </a:r>
-            <a:r>
-              <a:rPr lang="ja-JP" altLang="en-US" sz="1400" dirty="0" smtClean="0"/>
-              <a:t>区間の静的な要素、駆動、技術要素に関連するもので色付けを行いました。これにより複数のモデルで相互にたどることが可能になっております。可読性が下がると判断したため必要以上の色付けは行いません。特に重要であると判断した技術要素は</a:t>
-            </a:r>
-            <a:r>
-              <a:rPr lang="en-US" altLang="ja-JP" sz="1400" dirty="0" smtClean="0"/>
-              <a:t>P.5</a:t>
-            </a:r>
-            <a:r>
-              <a:rPr lang="ja-JP" altLang="en-US" sz="1400" dirty="0" smtClean="0"/>
-              <a:t>に記載し、</a:t>
-            </a:r>
-            <a:r>
-              <a:rPr lang="en-US" altLang="ja-JP" sz="1400" dirty="0" smtClean="0"/>
-              <a:t>P.4</a:t>
-            </a:r>
-            <a:r>
-              <a:rPr lang="ja-JP" altLang="en-US" sz="1400" dirty="0" smtClean="0"/>
-              <a:t>の難所走行戦略から参照している。</a:t>
-            </a:r>
-            <a:endParaRPr lang="en-US" altLang="ja-JP" sz="1400" dirty="0" smtClean="0"/>
-          </a:p>
-          <a:p>
-            <a:pPr marL="481013" indent="-481013" defTabSz="1279525">
-              <a:lnSpc>
-                <a:spcPct val="80000"/>
-              </a:lnSpc>
-              <a:spcBef>
-                <a:spcPct val="20000"/>
-              </a:spcBef>
-            </a:pPr>
-            <a:r>
-              <a:rPr lang="ja-JP" altLang="en-US" sz="1600" b="1" dirty="0" smtClean="0"/>
-              <a:t>☆</a:t>
-            </a:r>
-            <a:r>
-              <a:rPr lang="ja-JP" altLang="en-US" sz="1600" b="1" dirty="0"/>
-              <a:t>設計</a:t>
-            </a:r>
-            <a:r>
-              <a:rPr lang="ja-JP" altLang="en-US" sz="1600" b="1" dirty="0" smtClean="0"/>
-              <a:t>思想</a:t>
-            </a:r>
-            <a:endParaRPr lang="en-US" altLang="ja-JP" sz="1600" b="1" dirty="0"/>
-          </a:p>
-          <a:p>
-            <a:pPr marL="481013" indent="-481013" defTabSz="1279525">
-              <a:lnSpc>
-                <a:spcPct val="80000"/>
-              </a:lnSpc>
-              <a:spcBef>
-                <a:spcPct val="20000"/>
-              </a:spcBef>
-            </a:pPr>
-            <a:r>
-              <a:rPr lang="en-US" altLang="ja-JP" sz="1800" b="1" dirty="0"/>
-              <a:t>	</a:t>
-            </a:r>
-            <a:r>
-              <a:rPr lang="ja-JP" altLang="en-US" sz="1800" b="1" dirty="0" smtClean="0"/>
-              <a:t>　</a:t>
-            </a:r>
-            <a:r>
-              <a:rPr lang="ja-JP" altLang="en-US" sz="1400" dirty="0" smtClean="0"/>
-              <a:t>モデル</a:t>
-            </a:r>
-            <a:r>
-              <a:rPr lang="ja-JP" altLang="en-US" sz="1400" dirty="0"/>
-              <a:t>の再利用性の</a:t>
-            </a:r>
-            <a:r>
-              <a:rPr lang="ja-JP" altLang="en-US" sz="1400" dirty="0" smtClean="0"/>
-              <a:t>向上、関係を疎結合にし、チームでの開発を用意にする下図の役割を明確にしたパッケージの分割を行いました。また、パッケージ分けを開発の初期に行い、最初に立てた方針を意識しながら、設計することにより、モデルに</a:t>
-            </a:r>
-            <a:r>
-              <a:rPr lang="ja-JP" altLang="en-US" sz="1400" dirty="0"/>
-              <a:t>一貫性を</a:t>
-            </a:r>
-            <a:r>
-              <a:rPr lang="ja-JP" altLang="en-US" sz="1400" dirty="0" smtClean="0"/>
-              <a:t>持たせました．</a:t>
-            </a:r>
-            <a:endParaRPr lang="en-US" altLang="ja-JP" sz="1400" dirty="0"/>
-          </a:p>
-          <a:p>
-            <a:pPr marL="481013" indent="-481013" defTabSz="1279525">
-              <a:lnSpc>
-                <a:spcPct val="80000"/>
-              </a:lnSpc>
-              <a:spcBef>
-                <a:spcPct val="20000"/>
-              </a:spcBef>
-            </a:pPr>
-            <a:endParaRPr lang="en-US" altLang="ja-JP" sz="1400" dirty="0"/>
-          </a:p>
-          <a:p>
-            <a:pPr marL="481013" indent="-481013" defTabSz="1279525">
-              <a:lnSpc>
-                <a:spcPct val="80000"/>
-              </a:lnSpc>
-              <a:spcBef>
-                <a:spcPct val="20000"/>
-              </a:spcBef>
-            </a:pPr>
-            <a:endParaRPr lang="en-US" altLang="ja-JP" sz="1400" dirty="0"/>
-          </a:p>
-          <a:p>
-            <a:pPr marL="481013" indent="-481013" defTabSz="1279525">
-              <a:lnSpc>
-                <a:spcPct val="80000"/>
-              </a:lnSpc>
-              <a:spcBef>
-                <a:spcPct val="20000"/>
-              </a:spcBef>
-            </a:pPr>
-            <a:endParaRPr lang="en-US" altLang="ja-JP" sz="1400" dirty="0"/>
-          </a:p>
-          <a:p>
-            <a:pPr marL="481013" indent="-481013" defTabSz="1279525">
-              <a:lnSpc>
-                <a:spcPct val="80000"/>
-              </a:lnSpc>
-              <a:spcBef>
-                <a:spcPct val="20000"/>
-              </a:spcBef>
-            </a:pPr>
-            <a:endParaRPr lang="en-US" altLang="ja-JP" sz="1400" dirty="0"/>
-          </a:p>
-          <a:p>
-            <a:pPr marL="481013" indent="-481013" defTabSz="1279525">
-              <a:lnSpc>
-                <a:spcPct val="80000"/>
-              </a:lnSpc>
-              <a:spcBef>
-                <a:spcPct val="20000"/>
-              </a:spcBef>
-            </a:pPr>
-            <a:endParaRPr lang="en-US" altLang="ja-JP" sz="1600" dirty="0"/>
-          </a:p>
-          <a:p>
-            <a:pPr marL="481013" indent="-481013" defTabSz="1279525">
-              <a:lnSpc>
-                <a:spcPct val="80000"/>
-              </a:lnSpc>
-              <a:spcBef>
-                <a:spcPct val="20000"/>
-              </a:spcBef>
-            </a:pPr>
-            <a:r>
-              <a:rPr lang="ja-JP" altLang="en-US" sz="1600" b="1" dirty="0"/>
-              <a:t>☆モデルのここに注目！</a:t>
-            </a:r>
-          </a:p>
-          <a:p>
-            <a:pPr marL="481013" indent="-481013" defTabSz="1279525">
-              <a:lnSpc>
-                <a:spcPct val="80000"/>
-              </a:lnSpc>
-              <a:spcBef>
-                <a:spcPct val="20000"/>
-              </a:spcBef>
-            </a:pPr>
-            <a:r>
-              <a:rPr lang="ja-JP" altLang="en-US" sz="1400" dirty="0"/>
-              <a:t>	</a:t>
-            </a:r>
-            <a:r>
-              <a:rPr lang="ja-JP" altLang="en-US" sz="1400" dirty="0" smtClean="0"/>
-              <a:t>　</a:t>
-            </a:r>
-            <a:r>
-              <a:rPr lang="en-US" altLang="ja-JP" sz="1400" dirty="0" smtClean="0"/>
-              <a:t>ET</a:t>
-            </a:r>
-            <a:r>
-              <a:rPr lang="ja-JP" altLang="en-US" sz="1400" dirty="0"/>
-              <a:t>ロボコンはコースを分割した区間の</a:t>
-            </a:r>
-            <a:r>
-              <a:rPr lang="ja-JP" altLang="en-US" sz="1400" dirty="0" smtClean="0"/>
-              <a:t>連続．その</a:t>
-            </a:r>
-            <a:r>
-              <a:rPr lang="ja-JP" altLang="en-US" sz="1400" dirty="0"/>
-              <a:t>区間に応じたパラメータを設計すれば完走することが</a:t>
-            </a:r>
-            <a:r>
-              <a:rPr lang="ja-JP" altLang="en-US" sz="1400" dirty="0" smtClean="0"/>
-              <a:t>できる．その</a:t>
-            </a:r>
-            <a:r>
-              <a:rPr lang="ja-JP" altLang="en-US" sz="1400" dirty="0"/>
-              <a:t>流れを取り出してモデルに</a:t>
-            </a:r>
-            <a:r>
-              <a:rPr lang="ja-JP" altLang="en-US" sz="1400" dirty="0" smtClean="0"/>
-              <a:t>しました．</a:t>
-            </a:r>
-            <a:r>
-              <a:rPr lang="en-US" altLang="ja-JP" sz="2000" dirty="0"/>
-              <a:t/>
-            </a:r>
-            <a:br>
-              <a:rPr lang="en-US" altLang="ja-JP" sz="2000" dirty="0"/>
-            </a:br>
-            <a:endParaRPr lang="en-US" altLang="ja-JP" sz="1800" dirty="0"/>
-          </a:p>
-          <a:p>
-            <a:pPr marL="481013" indent="-481013" defTabSz="1279525">
-              <a:lnSpc>
-                <a:spcPct val="80000"/>
-              </a:lnSpc>
-              <a:spcBef>
-                <a:spcPct val="20000"/>
-              </a:spcBef>
-            </a:pPr>
-            <a:r>
-              <a:rPr lang="ja-JP" altLang="en-US" sz="1800" b="1" dirty="0"/>
-              <a:t>☆追加課題への</a:t>
-            </a:r>
-            <a:r>
-              <a:rPr lang="ja-JP" altLang="en-US" sz="1800" b="1" dirty="0" smtClean="0"/>
-              <a:t>取り組み</a:t>
-            </a:r>
-            <a:endParaRPr lang="en-US" altLang="ja-JP" sz="1800" b="1" dirty="0" smtClean="0"/>
-          </a:p>
-          <a:p>
-            <a:pPr marL="481013" indent="-481013" defTabSz="1279525">
-              <a:lnSpc>
-                <a:spcPct val="80000"/>
-              </a:lnSpc>
-              <a:spcBef>
-                <a:spcPct val="20000"/>
-              </a:spcBef>
-            </a:pPr>
-            <a:r>
-              <a:rPr lang="ja-JP" altLang="en-US" sz="1800" b="1" dirty="0"/>
-              <a:t>　</a:t>
-            </a:r>
-            <a:r>
-              <a:rPr lang="ja-JP" altLang="en-US" sz="1800" b="1" dirty="0" smtClean="0"/>
-              <a:t>　</a:t>
-            </a:r>
-            <a:r>
-              <a:rPr lang="ja-JP" altLang="en-US" sz="1600" dirty="0" smtClean="0"/>
-              <a:t>並行性設計について</a:t>
-            </a:r>
-            <a:endParaRPr lang="en-US" altLang="ja-JP" sz="1600" dirty="0" smtClean="0"/>
-          </a:p>
-          <a:p>
-            <a:r>
-              <a:rPr lang="ja-JP" altLang="en-US" sz="1200" dirty="0" smtClean="0">
-                <a:latin typeface="メイリオ" pitchFamily="50" charset="-128"/>
-                <a:ea typeface="メイリオ" pitchFamily="50" charset="-128"/>
-                <a:cs typeface="メイリオ" pitchFamily="50" charset="-128"/>
-              </a:rPr>
-              <a:t>・設計指針</a:t>
-            </a:r>
-            <a:endParaRPr lang="en-US" altLang="ja-JP" sz="1200" dirty="0" smtClean="0">
-              <a:latin typeface="メイリオ" pitchFamily="50" charset="-128"/>
-              <a:ea typeface="メイリオ" pitchFamily="50" charset="-128"/>
-              <a:cs typeface="メイリオ" pitchFamily="50" charset="-128"/>
-            </a:endParaRPr>
-          </a:p>
-          <a:p>
-            <a:r>
-              <a:rPr lang="ja-JP" altLang="en-US" sz="1200" dirty="0" smtClean="0">
-                <a:latin typeface="メイリオ" pitchFamily="50" charset="-128"/>
-                <a:ea typeface="メイリオ" pitchFamily="50" charset="-128"/>
-                <a:cs typeface="メイリオ" pitchFamily="50" charset="-128"/>
-              </a:rPr>
-              <a:t>走行体のバランス動作などのモータの駆動が一番優先するべきことである。それに対して</a:t>
-            </a:r>
-            <a:r>
-              <a:rPr lang="en-US" altLang="ja-JP" sz="1200" dirty="0" smtClean="0">
-                <a:latin typeface="メイリオ" pitchFamily="50" charset="-128"/>
-                <a:ea typeface="メイリオ" pitchFamily="50" charset="-128"/>
-                <a:cs typeface="メイリオ" pitchFamily="50" charset="-128"/>
-              </a:rPr>
-              <a:t>,</a:t>
-            </a:r>
-            <a:r>
-              <a:rPr lang="ja-JP" altLang="en-US" sz="1200" dirty="0" smtClean="0">
-                <a:latin typeface="メイリオ" pitchFamily="50" charset="-128"/>
-                <a:ea typeface="メイリオ" pitchFamily="50" charset="-128"/>
-                <a:cs typeface="メイリオ" pitchFamily="50" charset="-128"/>
-              </a:rPr>
-              <a:t>区間の切替ははるかに遅い周期でも十分に性能は得られると考えた</a:t>
-            </a:r>
-            <a:r>
-              <a:rPr lang="en-US" altLang="ja-JP" sz="1200" dirty="0" smtClean="0">
-                <a:latin typeface="メイリオ" pitchFamily="50" charset="-128"/>
-                <a:ea typeface="メイリオ" pitchFamily="50" charset="-128"/>
-                <a:cs typeface="メイリオ" pitchFamily="50" charset="-128"/>
-              </a:rPr>
-              <a:t>.</a:t>
-            </a:r>
-            <a:r>
-              <a:rPr lang="ja-JP" altLang="en-US" sz="1200" dirty="0" smtClean="0">
-                <a:latin typeface="メイリオ" pitchFamily="50" charset="-128"/>
-                <a:ea typeface="メイリオ" pitchFamily="50" charset="-128"/>
-                <a:cs typeface="メイリオ" pitchFamily="50" charset="-128"/>
-              </a:rPr>
-              <a:t>詳細は</a:t>
-            </a:r>
-            <a:r>
-              <a:rPr lang="en-US" altLang="ja-JP" sz="1200" dirty="0" smtClean="0">
-                <a:latin typeface="メイリオ" pitchFamily="50" charset="-128"/>
-                <a:ea typeface="メイリオ" pitchFamily="50" charset="-128"/>
-                <a:cs typeface="メイリオ" pitchFamily="50" charset="-128"/>
-              </a:rPr>
-              <a:t>P.3</a:t>
-            </a:r>
-            <a:r>
-              <a:rPr lang="ja-JP" altLang="en-US" sz="1200" dirty="0" smtClean="0">
-                <a:latin typeface="メイリオ" pitchFamily="50" charset="-128"/>
-                <a:ea typeface="メイリオ" pitchFamily="50" charset="-128"/>
-                <a:cs typeface="メイリオ" pitchFamily="50" charset="-128"/>
-              </a:rPr>
-              <a:t>並行性設計参照</a:t>
-            </a:r>
-            <a:r>
-              <a:rPr lang="en-US" altLang="ja-JP" sz="1200" dirty="0" smtClean="0">
-                <a:latin typeface="メイリオ" pitchFamily="50" charset="-128"/>
-                <a:ea typeface="メイリオ" pitchFamily="50" charset="-128"/>
-                <a:cs typeface="メイリオ" pitchFamily="50" charset="-128"/>
-              </a:rPr>
-              <a:t>.</a:t>
-            </a:r>
-          </a:p>
-          <a:p>
-            <a:r>
-              <a:rPr lang="ja-JP" altLang="en-US" sz="1200" dirty="0">
-                <a:latin typeface="メイリオ" pitchFamily="50" charset="-128"/>
-                <a:ea typeface="メイリオ" pitchFamily="50" charset="-128"/>
-                <a:cs typeface="メイリオ" pitchFamily="50" charset="-128"/>
-              </a:rPr>
-              <a:t>タスク</a:t>
-            </a:r>
-            <a:r>
-              <a:rPr lang="ja-JP" altLang="en-US" sz="1200" dirty="0" smtClean="0">
-                <a:latin typeface="メイリオ" pitchFamily="50" charset="-128"/>
-                <a:ea typeface="メイリオ" pitchFamily="50" charset="-128"/>
-                <a:cs typeface="メイリオ" pitchFamily="50" charset="-128"/>
-              </a:rPr>
-              <a:t>の構造を示すために２つのステレオタイプを用いた</a:t>
-            </a:r>
-            <a:r>
-              <a:rPr lang="en-US" altLang="ja-JP" sz="1200" dirty="0" smtClean="0">
-                <a:latin typeface="メイリオ" pitchFamily="50" charset="-128"/>
-                <a:ea typeface="メイリオ" pitchFamily="50" charset="-128"/>
-                <a:cs typeface="メイリオ" pitchFamily="50" charset="-128"/>
-              </a:rPr>
-              <a:t>.OS</a:t>
-            </a:r>
-            <a:r>
-              <a:rPr lang="ja-JP" altLang="en-US" sz="1200" dirty="0" err="1" smtClean="0">
-                <a:latin typeface="メイリオ" pitchFamily="50" charset="-128"/>
-                <a:ea typeface="メイリオ" pitchFamily="50" charset="-128"/>
-                <a:cs typeface="メイリオ" pitchFamily="50" charset="-128"/>
-              </a:rPr>
-              <a:t>の提</a:t>
-            </a:r>
-            <a:r>
-              <a:rPr lang="ja-JP" altLang="en-US" sz="1200" dirty="0" smtClean="0">
-                <a:latin typeface="メイリオ" pitchFamily="50" charset="-128"/>
-                <a:ea typeface="メイリオ" pitchFamily="50" charset="-128"/>
-                <a:cs typeface="メイリオ" pitchFamily="50" charset="-128"/>
-              </a:rPr>
-              <a:t>供する機能を</a:t>
-            </a:r>
-            <a:r>
-              <a:rPr lang="en-US" altLang="ja-JP" sz="1200" dirty="0" err="1" smtClean="0">
-                <a:latin typeface="メイリオ" pitchFamily="50" charset="-128"/>
-                <a:ea typeface="メイリオ" pitchFamily="50" charset="-128"/>
-                <a:cs typeface="メイリオ" pitchFamily="50" charset="-128"/>
-              </a:rPr>
-              <a:t>nxtOSEK</a:t>
-            </a:r>
-            <a:r>
-              <a:rPr lang="en-US" altLang="ja-JP" sz="1200" dirty="0" smtClean="0">
-                <a:latin typeface="メイリオ" pitchFamily="50" charset="-128"/>
-                <a:ea typeface="メイリオ" pitchFamily="50" charset="-128"/>
-                <a:cs typeface="メイリオ" pitchFamily="50" charset="-128"/>
-              </a:rPr>
-              <a:t>,</a:t>
-            </a:r>
-            <a:r>
-              <a:rPr lang="ja-JP" altLang="en-US" sz="1200" dirty="0" smtClean="0">
-                <a:latin typeface="メイリオ" pitchFamily="50" charset="-128"/>
-                <a:ea typeface="メイリオ" pitchFamily="50" charset="-128"/>
-                <a:cs typeface="メイリオ" pitchFamily="50" charset="-128"/>
-              </a:rPr>
-              <a:t>一つひとつのタスクを</a:t>
-            </a:r>
-            <a:r>
-              <a:rPr lang="en-US" altLang="ja-JP" sz="1200" dirty="0" smtClean="0">
-                <a:latin typeface="メイリオ" pitchFamily="50" charset="-128"/>
-                <a:ea typeface="メイリオ" pitchFamily="50" charset="-128"/>
-                <a:cs typeface="メイリオ" pitchFamily="50" charset="-128"/>
-              </a:rPr>
-              <a:t>TASK</a:t>
-            </a:r>
-            <a:r>
-              <a:rPr lang="ja-JP" altLang="en-US" sz="1200" dirty="0" smtClean="0">
-                <a:latin typeface="メイリオ" pitchFamily="50" charset="-128"/>
-                <a:ea typeface="メイリオ" pitchFamily="50" charset="-128"/>
-                <a:cs typeface="メイリオ" pitchFamily="50" charset="-128"/>
-              </a:rPr>
-              <a:t>としました</a:t>
-            </a:r>
-            <a:r>
-              <a:rPr lang="en-US" altLang="ja-JP" sz="1200" dirty="0" smtClean="0">
-                <a:latin typeface="メイリオ" pitchFamily="50" charset="-128"/>
-                <a:ea typeface="メイリオ" pitchFamily="50" charset="-128"/>
-                <a:cs typeface="メイリオ" pitchFamily="50" charset="-128"/>
-              </a:rPr>
-              <a:t>.</a:t>
-            </a:r>
-          </a:p>
-          <a:p>
-            <a:endParaRPr lang="en-US" altLang="ja-JP" sz="1200" dirty="0">
-              <a:latin typeface="メイリオ" pitchFamily="50" charset="-128"/>
-              <a:ea typeface="メイリオ" pitchFamily="50" charset="-128"/>
-              <a:cs typeface="メイリオ" pitchFamily="50" charset="-128"/>
-            </a:endParaRPr>
-          </a:p>
-          <a:p>
-            <a:r>
-              <a:rPr lang="ja-JP" altLang="en-US" sz="1200" dirty="0" smtClean="0">
-                <a:latin typeface="メイリオ" pitchFamily="50" charset="-128"/>
-                <a:ea typeface="メイリオ" pitchFamily="50" charset="-128"/>
-                <a:cs typeface="メイリオ" pitchFamily="50" charset="-128"/>
-              </a:rPr>
-              <a:t>・</a:t>
-            </a:r>
-            <a:r>
-              <a:rPr lang="ja-JP" altLang="en-US" sz="1400" dirty="0" smtClean="0">
-                <a:latin typeface="メイリオ" pitchFamily="50" charset="-128"/>
-                <a:ea typeface="メイリオ" pitchFamily="50" charset="-128"/>
-                <a:cs typeface="メイリオ" pitchFamily="50" charset="-128"/>
-              </a:rPr>
-              <a:t>要求モデルについて</a:t>
-            </a:r>
-            <a:endParaRPr lang="en-US" altLang="ja-JP" sz="1400" dirty="0" smtClean="0">
-              <a:latin typeface="メイリオ" pitchFamily="50" charset="-128"/>
-              <a:ea typeface="メイリオ" pitchFamily="50" charset="-128"/>
-              <a:cs typeface="メイリオ" pitchFamily="50" charset="-128"/>
-            </a:endParaRPr>
-          </a:p>
-          <a:p>
-            <a:r>
-              <a:rPr lang="ja-JP" altLang="en-US" sz="1200" dirty="0" smtClean="0">
-                <a:latin typeface="メイリオ" pitchFamily="50" charset="-128"/>
-                <a:ea typeface="メイリオ" pitchFamily="50" charset="-128"/>
-                <a:cs typeface="メイリオ" pitchFamily="50" charset="-128"/>
-              </a:rPr>
-              <a:t>大会における目標について</a:t>
-            </a:r>
-            <a:r>
-              <a:rPr lang="en-US" altLang="ja-JP" sz="1200" dirty="0" err="1" smtClean="0">
-                <a:latin typeface="メイリオ" pitchFamily="50" charset="-128"/>
-                <a:ea typeface="メイリオ" pitchFamily="50" charset="-128"/>
-                <a:cs typeface="メイリオ" pitchFamily="50" charset="-128"/>
-              </a:rPr>
-              <a:t>SysML</a:t>
-            </a:r>
-            <a:r>
-              <a:rPr lang="ja-JP" altLang="en-US" sz="1200" dirty="0" smtClean="0">
-                <a:latin typeface="メイリオ" pitchFamily="50" charset="-128"/>
-                <a:ea typeface="メイリオ" pitchFamily="50" charset="-128"/>
-                <a:cs typeface="メイリオ" pitchFamily="50" charset="-128"/>
-              </a:rPr>
-              <a:t>の要求図を使って分析しました。そこから機能要件、非機能要件を洗い出して、構造、振る舞いにつなげました</a:t>
-            </a:r>
-            <a:endParaRPr lang="en-US" altLang="ja-JP" sz="1200" dirty="0" smtClean="0">
-              <a:latin typeface="メイリオ" pitchFamily="50" charset="-128"/>
-              <a:ea typeface="メイリオ" pitchFamily="50" charset="-128"/>
-              <a:cs typeface="メイリオ" pitchFamily="50" charset="-128"/>
-            </a:endParaRPr>
-          </a:p>
-        </p:txBody>
-      </p:sp>
-      <p:sp>
-        <p:nvSpPr>
-          <p:cNvPr id="26" name="Rectangle 3"/>
-          <p:cNvSpPr>
-            <a:spLocks noChangeArrowheads="1"/>
-          </p:cNvSpPr>
-          <p:nvPr/>
-        </p:nvSpPr>
-        <p:spPr bwMode="auto">
-          <a:xfrm>
-            <a:off x="1031479" y="1533798"/>
-            <a:ext cx="5757862" cy="7344816"/>
-          </a:xfrm>
-          <a:prstGeom prst="rect">
-            <a:avLst/>
-          </a:prstGeom>
-          <a:noFill/>
-          <a:ln>
-            <a:noFill/>
-          </a:ln>
-          <a:extLst>
-            <a:ext uri="{909E8E84-426E-40DD-AFC4-6F175D3DCCD1}">
-              <a14:hiddenFill xmlns:a14="http://schemas.microsoft.com/office/drawing/2010/main">
-                <a:solidFill>
-                  <a:srgbClr val="FFFFFF"/>
-                </a:solidFill>
-              </a14:hiddenFill>
-            </a:ext>
-            <a:ext uri="{91240B29-F687-4F45-9708-019B960494DF}">
-              <a14:hiddenLine xmlns:a14="http://schemas.microsoft.com/office/drawing/2010/main" w="9525">
-                <a:solidFill>
-                  <a:srgbClr val="000000"/>
-                </a:solidFill>
-                <a:miter lim="800000"/>
-                <a:headEnd/>
-                <a:tailEnd/>
-              </a14:hiddenLine>
-            </a:ext>
-          </a:extLst>
-        </p:spPr>
-        <p:txBody>
-          <a:bodyPr lIns="127998" tIns="63999" rIns="127998" bIns="63999"/>
-          <a:lstStyle/>
-          <a:p>
-            <a:pPr marL="481013" indent="-481013" defTabSz="1279525">
-              <a:lnSpc>
-                <a:spcPct val="80000"/>
-              </a:lnSpc>
-              <a:spcBef>
-                <a:spcPct val="20000"/>
-              </a:spcBef>
-            </a:pPr>
-            <a:r>
-              <a:rPr lang="en-US" altLang="ja-JP" sz="2000" b="1" dirty="0"/>
-              <a:t>☆</a:t>
-            </a:r>
-            <a:r>
-              <a:rPr lang="ja-JP" altLang="en-US" sz="2000" b="1" dirty="0"/>
-              <a:t>チーム</a:t>
-            </a:r>
-            <a:r>
-              <a:rPr lang="ja-JP" altLang="en-US" sz="2000" b="1" dirty="0" smtClean="0"/>
-              <a:t>紹介</a:t>
-            </a:r>
-            <a:endParaRPr lang="ja-JP" altLang="en-US" sz="2000" b="1" dirty="0"/>
-          </a:p>
-          <a:p>
-            <a:pPr marL="481013" indent="-481013" defTabSz="1279525">
-              <a:lnSpc>
-                <a:spcPct val="80000"/>
-              </a:lnSpc>
-              <a:spcBef>
-                <a:spcPct val="20000"/>
-              </a:spcBef>
-            </a:pPr>
-            <a:endParaRPr lang="en-US" altLang="ja-JP" sz="1800" b="1" dirty="0" smtClean="0"/>
-          </a:p>
-          <a:p>
-            <a:pPr marL="481013" indent="-481013" defTabSz="1279525">
-              <a:lnSpc>
-                <a:spcPct val="80000"/>
-              </a:lnSpc>
-              <a:spcBef>
-                <a:spcPct val="20000"/>
-              </a:spcBef>
-            </a:pPr>
-            <a:endParaRPr lang="en-US" altLang="ja-JP" sz="1800" b="1" dirty="0"/>
-          </a:p>
-          <a:p>
-            <a:pPr marL="481013" indent="-481013" defTabSz="1279525">
-              <a:lnSpc>
-                <a:spcPct val="80000"/>
-              </a:lnSpc>
-              <a:spcBef>
-                <a:spcPct val="20000"/>
-              </a:spcBef>
-            </a:pPr>
-            <a:endParaRPr lang="en-US" altLang="ja-JP" sz="1100" b="1" dirty="0"/>
-          </a:p>
-          <a:p>
-            <a:pPr marL="481013" indent="-481013" defTabSz="1279525">
-              <a:lnSpc>
-                <a:spcPct val="80000"/>
-              </a:lnSpc>
-              <a:spcBef>
-                <a:spcPct val="20000"/>
-              </a:spcBef>
-            </a:pPr>
-            <a:r>
-              <a:rPr lang="ja-JP" altLang="en-US" sz="1100" b="1" dirty="0" smtClean="0"/>
-              <a:t>　　　</a:t>
-            </a:r>
-            <a:r>
-              <a:rPr lang="ja-JP" altLang="en-US" sz="1600" b="1" dirty="0" smtClean="0"/>
-              <a:t>　</a:t>
-            </a:r>
-            <a:r>
-              <a:rPr lang="ja-JP" altLang="en-US" sz="1600" dirty="0" smtClean="0"/>
-              <a:t>高専の３年生から７年生（専攻科２年生）７名で構成されるチームです。１０代最後の夏休みを女の子ではなくロボットと共に過ごすことを選択したメンバーもおり、意気込みは十分です。メンバーが入院するといったトラブルに見みまわわれながらも、お互いをカバーし合いながら取り組んできました。この大会を通して技術的な面だけで無く</a:t>
-            </a:r>
-            <a:r>
-              <a:rPr lang="ja-JP" altLang="en-US" sz="1600" dirty="0"/>
-              <a:t>常に</a:t>
-            </a:r>
-            <a:r>
-              <a:rPr lang="ja-JP" altLang="en-US" sz="1600" dirty="0" smtClean="0"/>
-              <a:t>なにか得ようと、自らを向上させようという姿勢がありました。こんなチームで大会に望みます。</a:t>
-            </a:r>
-            <a:endParaRPr lang="en-US" altLang="ja-JP" sz="1100" dirty="0"/>
-          </a:p>
-          <a:p>
-            <a:pPr marL="481013" indent="-481013" defTabSz="1279525">
-              <a:lnSpc>
-                <a:spcPct val="80000"/>
-              </a:lnSpc>
-              <a:spcBef>
-                <a:spcPct val="20000"/>
-              </a:spcBef>
-            </a:pPr>
-            <a:r>
-              <a:rPr lang="en-US" altLang="ja-JP" sz="1800" dirty="0" smtClean="0"/>
-              <a:t>	</a:t>
-            </a:r>
-          </a:p>
-          <a:p>
-            <a:pPr marL="481013" indent="-481013" defTabSz="1279525">
-              <a:lnSpc>
-                <a:spcPct val="80000"/>
-              </a:lnSpc>
-              <a:spcBef>
-                <a:spcPct val="20000"/>
-              </a:spcBef>
-            </a:pPr>
-            <a:r>
-              <a:rPr lang="ja-JP" altLang="en-US" sz="1800" b="1" dirty="0" smtClean="0"/>
-              <a:t>☆組込み，そして</a:t>
-            </a:r>
-            <a:r>
-              <a:rPr lang="ja-JP" altLang="en-US" sz="1800" b="1" dirty="0"/>
-              <a:t>モデリングの未来へ一言</a:t>
-            </a:r>
-          </a:p>
-          <a:p>
-            <a:pPr marL="481013" indent="-481013" defTabSz="1279525">
-              <a:lnSpc>
-                <a:spcPct val="80000"/>
-              </a:lnSpc>
-              <a:spcBef>
-                <a:spcPct val="20000"/>
-              </a:spcBef>
-            </a:pPr>
-            <a:r>
-              <a:rPr lang="en-US" altLang="ja-JP" sz="1600" dirty="0"/>
-              <a:t>	</a:t>
-            </a:r>
-            <a:r>
-              <a:rPr lang="ja-JP" altLang="en-US" sz="1600" dirty="0" smtClean="0"/>
-              <a:t>　モデリングの根底に流れる重要な考え方のひとつは「抽象化思考」です。これは新しい</a:t>
-            </a:r>
-            <a:r>
-              <a:rPr lang="ja-JP" altLang="en-US" sz="1600" dirty="0"/>
-              <a:t>技術</a:t>
-            </a:r>
-            <a:r>
-              <a:rPr lang="ja-JP" altLang="en-US" sz="1600" dirty="0" smtClean="0"/>
-              <a:t>がどんどん出てくるこの分野でも廃れることなく常に通用する技術です。社会人や学生が参加するこのコンテストを通してこの武器が広く日本に普及し、組み込み業界だけ</a:t>
-            </a:r>
-            <a:r>
-              <a:rPr lang="ja-JP" altLang="en-US" sz="1600" dirty="0"/>
-              <a:t>でなく、すべてのエンジニアが</a:t>
-            </a:r>
-            <a:r>
-              <a:rPr lang="ja-JP" altLang="en-US" sz="1600" dirty="0" smtClean="0"/>
-              <a:t>ハッピーになれる日が来ると願っております。</a:t>
-            </a:r>
-            <a:endParaRPr lang="ja-JP" altLang="en-US" sz="1600" b="1" dirty="0"/>
-          </a:p>
-          <a:p>
-            <a:pPr marL="481013" indent="-481013" defTabSz="1279525">
-              <a:lnSpc>
-                <a:spcPct val="80000"/>
-              </a:lnSpc>
-              <a:spcBef>
-                <a:spcPct val="20000"/>
-              </a:spcBef>
-            </a:pPr>
-            <a:endParaRPr lang="ja-JP" altLang="en-US" sz="1600" b="1" dirty="0"/>
-          </a:p>
-          <a:p>
-            <a:pPr marL="481013" indent="-481013" defTabSz="1279525">
-              <a:lnSpc>
-                <a:spcPct val="80000"/>
-              </a:lnSpc>
-              <a:spcBef>
-                <a:spcPct val="20000"/>
-              </a:spcBef>
-            </a:pPr>
-            <a:r>
-              <a:rPr lang="ja-JP" altLang="en-US" sz="1800" b="1" dirty="0"/>
-              <a:t>☆コンテストにかける</a:t>
-            </a:r>
-            <a:r>
-              <a:rPr lang="ja-JP" altLang="en-US" sz="1800" b="1" dirty="0" smtClean="0"/>
-              <a:t>意気込み，アピール</a:t>
-            </a:r>
-            <a:endParaRPr lang="ja-JP" altLang="en-US" sz="1800" b="1" dirty="0"/>
-          </a:p>
-          <a:p>
-            <a:pPr marL="481013" indent="-481013" defTabSz="1279525">
-              <a:lnSpc>
-                <a:spcPct val="80000"/>
-              </a:lnSpc>
-              <a:spcBef>
-                <a:spcPct val="20000"/>
-              </a:spcBef>
-            </a:pPr>
-            <a:r>
-              <a:rPr lang="en-US" altLang="ja-JP" sz="1800" dirty="0"/>
-              <a:t>	</a:t>
-            </a:r>
-            <a:r>
-              <a:rPr lang="ja-JP" altLang="en-US" sz="1800" dirty="0" smtClean="0"/>
-              <a:t>　</a:t>
-            </a:r>
-            <a:r>
-              <a:rPr lang="ja-JP" altLang="en-US" sz="1600" dirty="0" smtClean="0">
-                <a:latin typeface="+mj-ea"/>
-                <a:ea typeface="+mj-ea"/>
-              </a:rPr>
-              <a:t>昨年</a:t>
-            </a:r>
-            <a:r>
-              <a:rPr lang="ja-JP" altLang="en-US" sz="1600" dirty="0">
-                <a:latin typeface="+mj-ea"/>
-                <a:ea typeface="+mj-ea"/>
-              </a:rPr>
-              <a:t>果たせなかった悲願の全国大会出場</a:t>
-            </a:r>
-            <a:r>
-              <a:rPr lang="ja-JP" altLang="en-US" sz="1600" dirty="0" smtClean="0">
-                <a:latin typeface="+mj-ea"/>
-                <a:ea typeface="+mj-ea"/>
-              </a:rPr>
-              <a:t>を</a:t>
-            </a:r>
-            <a:r>
-              <a:rPr lang="en-US" altLang="ja-JP" sz="1600" dirty="0" smtClean="0">
-                <a:latin typeface="+mj-ea"/>
-                <a:ea typeface="+mj-ea"/>
-              </a:rPr>
-              <a:t/>
-            </a:r>
-            <a:br>
-              <a:rPr lang="en-US" altLang="ja-JP" sz="1600" dirty="0" smtClean="0">
-                <a:latin typeface="+mj-ea"/>
-                <a:ea typeface="+mj-ea"/>
-              </a:rPr>
-            </a:br>
-            <a:r>
-              <a:rPr lang="ja-JP" altLang="en-US" sz="1600" dirty="0">
-                <a:latin typeface="+mj-ea"/>
-                <a:ea typeface="+mj-ea"/>
-              </a:rPr>
-              <a:t>果たします</a:t>
-            </a:r>
-            <a:r>
-              <a:rPr lang="ja-JP" altLang="en-US" sz="1600" dirty="0" smtClean="0">
-                <a:latin typeface="+mj-ea"/>
-                <a:ea typeface="+mj-ea"/>
-              </a:rPr>
-              <a:t>！！</a:t>
-            </a:r>
-            <a:r>
-              <a:rPr lang="en-US" altLang="ja-JP" sz="1600" dirty="0" smtClean="0">
-                <a:latin typeface="+mj-ea"/>
-                <a:ea typeface="+mj-ea"/>
-              </a:rPr>
-              <a:t/>
-            </a:r>
-            <a:br>
-              <a:rPr lang="en-US" altLang="ja-JP" sz="1600" dirty="0" smtClean="0">
-                <a:latin typeface="+mj-ea"/>
-                <a:ea typeface="+mj-ea"/>
-              </a:rPr>
-            </a:br>
-            <a:r>
-              <a:rPr lang="ja-JP" altLang="en-US" sz="1600" dirty="0" smtClean="0">
-                <a:latin typeface="+mj-ea"/>
-                <a:ea typeface="+mj-ea"/>
-              </a:rPr>
-              <a:t>高専で</a:t>
-            </a:r>
-            <a:r>
-              <a:rPr lang="en-US" altLang="ja-JP" sz="1600" dirty="0" smtClean="0">
-                <a:latin typeface="+mj-ea"/>
-                <a:ea typeface="+mj-ea"/>
-              </a:rPr>
-              <a:t>15</a:t>
-            </a:r>
-            <a:r>
-              <a:rPr lang="ja-JP" altLang="en-US" sz="1600" dirty="0" smtClean="0">
-                <a:latin typeface="+mj-ea"/>
-                <a:ea typeface="+mj-ea"/>
-              </a:rPr>
-              <a:t>歳から受けた教育をベースにした高専生</a:t>
-            </a:r>
-            <a:r>
-              <a:rPr lang="ja-JP" altLang="en-US" sz="1600" dirty="0">
-                <a:latin typeface="+mj-ea"/>
-                <a:ea typeface="+mj-ea"/>
-              </a:rPr>
-              <a:t>の実力</a:t>
-            </a:r>
-            <a:r>
-              <a:rPr lang="ja-JP" altLang="en-US" sz="1600" dirty="0" smtClean="0">
-                <a:latin typeface="+mj-ea"/>
-                <a:ea typeface="+mj-ea"/>
-              </a:rPr>
-              <a:t>をお見せします！</a:t>
-            </a:r>
-            <a:r>
-              <a:rPr lang="en-US" altLang="ja-JP" sz="1600" dirty="0" smtClean="0">
-                <a:latin typeface="+mj-ea"/>
-                <a:ea typeface="+mj-ea"/>
-              </a:rPr>
-              <a:t/>
-            </a:r>
-            <a:br>
-              <a:rPr lang="en-US" altLang="ja-JP" sz="1600" dirty="0" smtClean="0">
-                <a:latin typeface="+mj-ea"/>
-                <a:ea typeface="+mj-ea"/>
-              </a:rPr>
-            </a:br>
-            <a:r>
-              <a:rPr lang="ja-JP" altLang="en-US" sz="1600" dirty="0" smtClean="0">
-                <a:latin typeface="+mj-ea"/>
-                <a:ea typeface="+mj-ea"/>
-              </a:rPr>
-              <a:t>こん</a:t>
-            </a:r>
-            <a:r>
-              <a:rPr lang="ja-JP" altLang="en-US" sz="1600" dirty="0" err="1">
-                <a:latin typeface="+mj-ea"/>
-                <a:ea typeface="+mj-ea"/>
-              </a:rPr>
-              <a:t>ぶは</a:t>
-            </a:r>
-            <a:r>
-              <a:rPr lang="ja-JP" altLang="en-US" sz="1600" dirty="0">
-                <a:latin typeface="+mj-ea"/>
-                <a:ea typeface="+mj-ea"/>
-              </a:rPr>
-              <a:t>頭の栄養！！いいこんぶ！</a:t>
-            </a:r>
-            <a:r>
-              <a:rPr lang="en-US" altLang="ja-JP" sz="1900" dirty="0"/>
-              <a:t>	</a:t>
-            </a:r>
-          </a:p>
-        </p:txBody>
-      </p:sp>
-      <p:sp>
-        <p:nvSpPr>
-          <p:cNvPr id="10" name="Rectangle 4"/>
-          <p:cNvSpPr>
-            <a:spLocks noChangeArrowheads="1"/>
-          </p:cNvSpPr>
-          <p:nvPr/>
-        </p:nvSpPr>
-        <p:spPr bwMode="auto">
-          <a:xfrm>
-            <a:off x="5639992" y="1272208"/>
-            <a:ext cx="1595487" cy="2568054"/>
-          </a:xfrm>
-          <a:prstGeom prst="rect">
-            <a:avLst/>
-          </a:prstGeom>
-          <a:noFill/>
-          <a:ln>
-            <a:noFill/>
-          </a:ln>
-          <a:extLst>
-            <a:ext uri="{909E8E84-426E-40DD-AFC4-6F175D3DCCD1}">
-              <a14:hiddenFill xmlns:a14="http://schemas.microsoft.com/office/drawing/2010/main">
-                <a:solidFill>
-                  <a:srgbClr val="FFFFFF"/>
-                </a:solidFill>
-              </a14:hiddenFill>
-            </a:ext>
-            <a:ext uri="{91240B29-F687-4F45-9708-019B960494DF}">
-              <a14:hiddenLine xmlns:a14="http://schemas.microsoft.com/office/drawing/2010/main" w="9525">
-                <a:solidFill>
-                  <a:srgbClr val="000000"/>
-                </a:solidFill>
-                <a:miter lim="800000"/>
-                <a:headEnd/>
-                <a:tailEnd/>
-              </a14:hiddenLine>
-            </a:ext>
-          </a:extLst>
-        </p:spPr>
-        <p:txBody>
-          <a:bodyPr lIns="127998" tIns="63999" rIns="127998" bIns="63999"/>
-          <a:lstStyle/>
-          <a:p>
-            <a:pPr marL="481013" indent="-481013" defTabSz="1279525">
-              <a:lnSpc>
-                <a:spcPct val="80000"/>
-              </a:lnSpc>
-              <a:spcBef>
-                <a:spcPct val="20000"/>
-              </a:spcBef>
-            </a:pPr>
-            <a:endParaRPr lang="en-US" altLang="ja-JP" sz="1400" dirty="0" smtClean="0">
-              <a:latin typeface="メイリオ" pitchFamily="50" charset="-128"/>
-              <a:ea typeface="メイリオ" pitchFamily="50" charset="-128"/>
-              <a:cs typeface="メイリオ" pitchFamily="50" charset="-128"/>
-            </a:endParaRPr>
-          </a:p>
-        </p:txBody>
-      </p:sp>
-      <p:pic>
-        <p:nvPicPr>
-          <p:cNvPr id="11" name="Picture 5"/>
-          <p:cNvPicPr>
-            <a:picLocks noChangeAspect="1" noChangeArrowheads="1"/>
-          </p:cNvPicPr>
-          <p:nvPr/>
-        </p:nvPicPr>
-        <p:blipFill>
-          <a:blip r:embed="rId6">
-            <a:extLst>
-              <a:ext uri="{28A0092B-C50C-407E-A947-70E740481C1C}">
-                <a14:useLocalDpi xmlns:a14="http://schemas.microsoft.com/office/drawing/2010/main" val="0"/>
-              </a:ext>
-            </a:extLst>
-          </a:blip>
-          <a:srcRect/>
-          <a:stretch>
-            <a:fillRect/>
-          </a:stretch>
-        </p:blipFill>
-        <p:spPr bwMode="auto">
-          <a:xfrm>
-            <a:off x="10554254" y="4152528"/>
-            <a:ext cx="2264315" cy="1440160"/>
-          </a:xfrm>
-          <a:prstGeom prst="rect">
-            <a:avLst/>
-          </a:prstGeom>
-          <a:noFill/>
-          <a:ln>
-            <a:noFill/>
-          </a:ln>
-          <a:effectLst/>
-          <a:extLst>
-            <a:ext uri="{909E8E84-426E-40DD-AFC4-6F175D3DCCD1}">
-              <a14:hiddenFill xmlns:a14="http://schemas.microsoft.com/office/drawing/2010/main">
-                <a:solidFill>
-                  <a:schemeClr val="accent1"/>
-                </a:solidFill>
-              </a14:hiddenFill>
-            </a:ext>
-            <a:ext uri="{91240B29-F687-4F45-9708-019B960494DF}">
-              <a14:hiddenLine xmlns:a14="http://schemas.microsoft.com/office/drawing/2010/main" w="9525">
-                <a:solidFill>
-                  <a:schemeClr val="tx1"/>
-                </a:solidFill>
-                <a:miter lim="800000"/>
-                <a:headEnd/>
-                <a:tailEnd/>
-              </a14:hiddenLine>
-            </a:ext>
-            <a:ext uri="{AF507438-7753-43E0-B8FC-AC1667EBCBE1}">
-              <a14:hiddenEffects xmlns:a14="http://schemas.microsoft.com/office/drawing/2010/main">
-                <a:effectLst>
-                  <a:outerShdw dist="35921" dir="2700000" algn="ctr" rotWithShape="0">
-                    <a:schemeClr val="bg2"/>
-                  </a:outerShdw>
-                </a:effectLst>
-              </a14:hiddenEffects>
-            </a:ext>
-          </a:extLst>
-        </p:spPr>
-      </p:pic>
-    </p:spTree>
-    <p:extLst>
-      <p:ext uri="{BB962C8B-B14F-4D97-AF65-F5344CB8AC3E}">
-        <p14:creationId xmlns:p14="http://schemas.microsoft.com/office/powerpoint/2010/main" val="2563905446"/>
-      </p:ext>
-    </p:extLst>
-  </p:cSld>
-  <p:clrMapOvr>
-    <a:masterClrMapping/>
-  </p:clrMapOvr>
-  <p:timing>
-    <p:tnLst>
-      <p:par>
-        <p:cTn id="1" dur="indefinite" restart="never" nodeType="tmRoot"/>
-      </p:par>
-    </p:tnLst>
-  </p:timing>
-</p:sld>
-</file>
-
 <file path=ppt/theme/theme1.xml><?xml version="1.0" encoding="utf-8"?>
 <a:theme xmlns:a="http://schemas.openxmlformats.org/drawingml/2006/main" name="Office ​​テーマ">
   <a:themeElements>

</xml_diff>